<commit_message>
Arbol de procesos punto 7
</commit_message>
<xml_diff>
--- a/Practica4/Arbol.pptx
+++ b/Practica4/Arbol.pptx
@@ -7,6 +7,8 @@
   <p:sldIdLst>
     <p:sldId id="256" r:id="rId2"/>
     <p:sldId id="257" r:id="rId3"/>
+    <p:sldId id="258" r:id="rId4"/>
+    <p:sldId id="259" r:id="rId5"/>
   </p:sldIdLst>
   <p:sldSz cx="12192000" cy="6858000"/>
   <p:notesSz cx="6858000" cy="9144000"/>
@@ -105,6 +107,11 @@
       </a:defRPr>
     </a:lvl9pPr>
   </p:defaultTextStyle>
+  <p:extLst>
+    <p:ext uri="{EFAFB233-063F-42B5-8137-9DF3F51BA10A}">
+      <p15:sldGuideLst xmlns:p15="http://schemas.microsoft.com/office/powerpoint/2012/main"/>
+    </p:ext>
+  </p:extLst>
 </p:presentation>
 </file>
 
@@ -7630,8 +7637,8 @@
         </p:nvSpPr>
         <p:spPr>
           <a:xfrm>
-            <a:off x="5489265" y="423123"/>
-            <a:ext cx="1180407" cy="523220"/>
+            <a:off x="4747089" y="52868"/>
+            <a:ext cx="2489314" cy="954107"/>
           </a:xfrm>
           <a:prstGeom prst="rect">
             <a:avLst/>
@@ -7644,11 +7651,23 @@
           </a:bodyPr>
           <a:lstStyle/>
           <a:p>
+            <a:pPr algn="ctr"/>
             <a:r>
               <a:rPr lang="es-MX" sz="2800" b="1" dirty="0">
                 <a:latin typeface="Century Gothic" panose="020B0502020202020204" pitchFamily="34" charset="0"/>
               </a:rPr>
               <a:t>main</a:t>
+            </a:r>
+            <a:br>
+              <a:rPr lang="es-MX" sz="2800" b="1" dirty="0">
+                <a:latin typeface="Century Gothic" panose="020B0502020202020204" pitchFamily="34" charset="0"/>
+              </a:rPr>
+            </a:br>
+            <a:r>
+              <a:rPr lang="es-MX" sz="2800" b="1" dirty="0">
+                <a:latin typeface="Century Gothic" panose="020B0502020202020204" pitchFamily="34" charset="0"/>
+              </a:rPr>
+              <a:t>Leer archivos</a:t>
             </a:r>
             <a:endParaRPr lang="es-MX" b="1" dirty="0">
               <a:latin typeface="Century Gothic" panose="020B0502020202020204" pitchFamily="34" charset="0"/>
@@ -7753,12 +7772,861 @@
           </a:p>
         </p:txBody>
       </p:sp>
-      <p:sp>
-        <p:nvSpPr>
-          <p:cNvPr id="16" name="Elipse 15">
-            <a:extLst>
-              <a:ext uri="{FF2B5EF4-FFF2-40B4-BE49-F238E27FC236}">
-                <a16:creationId xmlns:a16="http://schemas.microsoft.com/office/drawing/2014/main" id="{8E7A95DB-7809-4E31-AD6C-31D10B4350F9}"/>
+      <p:cxnSp>
+        <p:nvCxnSpPr>
+          <p:cNvPr id="25" name="Conector recto 24">
+            <a:extLst>
+              <a:ext uri="{FF2B5EF4-FFF2-40B4-BE49-F238E27FC236}">
+                <a16:creationId xmlns:a16="http://schemas.microsoft.com/office/drawing/2014/main" id="{B0FD8281-375C-402B-9270-69A7E2DE5C7C}"/>
+              </a:ext>
+            </a:extLst>
+          </p:cNvPr>
+          <p:cNvCxnSpPr>
+            <a:cxnSpLocks/>
+          </p:cNvCxnSpPr>
+          <p:nvPr/>
+        </p:nvCxnSpPr>
+        <p:spPr>
+          <a:xfrm flipV="1">
+            <a:off x="1536826" y="1377529"/>
+            <a:ext cx="4454920" cy="2594555"/>
+          </a:xfrm>
+          <a:prstGeom prst="line">
+            <a:avLst/>
+          </a:prstGeom>
+          <a:ln w="38100">
+            <a:solidFill>
+              <a:schemeClr val="tx1"/>
+            </a:solidFill>
+          </a:ln>
+        </p:spPr>
+        <p:style>
+          <a:lnRef idx="1">
+            <a:schemeClr val="accent1"/>
+          </a:lnRef>
+          <a:fillRef idx="0">
+            <a:schemeClr val="accent1"/>
+          </a:fillRef>
+          <a:effectRef idx="0">
+            <a:schemeClr val="accent1"/>
+          </a:effectRef>
+          <a:fontRef idx="minor">
+            <a:schemeClr val="tx1"/>
+          </a:fontRef>
+        </p:style>
+      </p:cxnSp>
+      <p:sp>
+        <p:nvSpPr>
+          <p:cNvPr id="126" name="CuadroTexto 125">
+            <a:extLst>
+              <a:ext uri="{FF2B5EF4-FFF2-40B4-BE49-F238E27FC236}">
+                <a16:creationId xmlns:a16="http://schemas.microsoft.com/office/drawing/2014/main" id="{AE1F9CBA-DD73-4516-83C9-1358C3C4AFCA}"/>
+              </a:ext>
+            </a:extLst>
+          </p:cNvPr>
+          <p:cNvSpPr txBox="1"/>
+          <p:nvPr/>
+        </p:nvSpPr>
+        <p:spPr>
+          <a:xfrm>
+            <a:off x="447758" y="4300795"/>
+            <a:ext cx="1493150" cy="461665"/>
+          </a:xfrm>
+          <a:prstGeom prst="rect">
+            <a:avLst/>
+          </a:prstGeom>
+          <a:noFill/>
+        </p:spPr>
+        <p:txBody>
+          <a:bodyPr wrap="square" rtlCol="0">
+            <a:spAutoFit/>
+          </a:bodyPr>
+          <a:lstStyle/>
+          <a:p>
+            <a:pPr algn="ctr"/>
+            <a:r>
+              <a:rPr lang="es-MX" sz="2400" b="1" dirty="0">
+                <a:latin typeface="Century Gothic" panose="020B0502020202020204" pitchFamily="34" charset="0"/>
+              </a:rPr>
+              <a:t>Sumar</a:t>
+            </a:r>
+            <a:endParaRPr lang="es-MX" b="1" dirty="0">
+              <a:latin typeface="Century Gothic" panose="020B0502020202020204" pitchFamily="34" charset="0"/>
+            </a:endParaRPr>
+          </a:p>
+        </p:txBody>
+      </p:sp>
+      <p:sp>
+        <p:nvSpPr>
+          <p:cNvPr id="143" name="Elipse 142">
+            <a:extLst>
+              <a:ext uri="{FF2B5EF4-FFF2-40B4-BE49-F238E27FC236}">
+                <a16:creationId xmlns:a16="http://schemas.microsoft.com/office/drawing/2014/main" id="{C52DEBF3-6F38-46B1-A2C9-B54C87FB49B7}"/>
+              </a:ext>
+            </a:extLst>
+          </p:cNvPr>
+          <p:cNvSpPr/>
+          <p:nvPr/>
+        </p:nvSpPr>
+        <p:spPr>
+          <a:xfrm>
+            <a:off x="2899619" y="3832964"/>
+            <a:ext cx="1368657" cy="1338320"/>
+          </a:xfrm>
+          <a:prstGeom prst="ellipse">
+            <a:avLst/>
+          </a:prstGeom>
+          <a:solidFill>
+            <a:srgbClr val="DE7EA9"/>
+          </a:solidFill>
+          <a:ln>
+            <a:solidFill>
+              <a:srgbClr val="D8669A"/>
+            </a:solidFill>
+          </a:ln>
+        </p:spPr>
+        <p:style>
+          <a:lnRef idx="2">
+            <a:schemeClr val="accent1">
+              <a:shade val="50000"/>
+            </a:schemeClr>
+          </a:lnRef>
+          <a:fillRef idx="1">
+            <a:schemeClr val="accent1"/>
+          </a:fillRef>
+          <a:effectRef idx="0">
+            <a:schemeClr val="accent1"/>
+          </a:effectRef>
+          <a:fontRef idx="minor">
+            <a:schemeClr val="lt1"/>
+          </a:fontRef>
+        </p:style>
+        <p:txBody>
+          <a:bodyPr rtlCol="0" anchor="ctr"/>
+          <a:lstStyle/>
+          <a:p>
+            <a:pPr algn="ctr"/>
+            <a:endParaRPr lang="es-MX"/>
+          </a:p>
+        </p:txBody>
+      </p:sp>
+      <p:sp>
+        <p:nvSpPr>
+          <p:cNvPr id="144" name="CuadroTexto 143">
+            <a:extLst>
+              <a:ext uri="{FF2B5EF4-FFF2-40B4-BE49-F238E27FC236}">
+                <a16:creationId xmlns:a16="http://schemas.microsoft.com/office/drawing/2014/main" id="{044DB7F7-6524-4983-8971-E9CB343AFDD4}"/>
+              </a:ext>
+            </a:extLst>
+          </p:cNvPr>
+          <p:cNvSpPr txBox="1"/>
+          <p:nvPr/>
+        </p:nvSpPr>
+        <p:spPr>
+          <a:xfrm>
+            <a:off x="2837372" y="4271291"/>
+            <a:ext cx="1493150" cy="461665"/>
+          </a:xfrm>
+          <a:prstGeom prst="rect">
+            <a:avLst/>
+          </a:prstGeom>
+          <a:noFill/>
+        </p:spPr>
+        <p:txBody>
+          <a:bodyPr wrap="square" rtlCol="0">
+            <a:spAutoFit/>
+          </a:bodyPr>
+          <a:lstStyle/>
+          <a:p>
+            <a:pPr algn="ctr"/>
+            <a:r>
+              <a:rPr lang="es-MX" sz="2400" b="1" dirty="0">
+                <a:latin typeface="Century Gothic" panose="020B0502020202020204" pitchFamily="34" charset="0"/>
+              </a:rPr>
+              <a:t>Restar</a:t>
+            </a:r>
+            <a:endParaRPr lang="es-MX" b="1" dirty="0">
+              <a:latin typeface="Century Gothic" panose="020B0502020202020204" pitchFamily="34" charset="0"/>
+            </a:endParaRPr>
+          </a:p>
+        </p:txBody>
+      </p:sp>
+      <p:sp>
+        <p:nvSpPr>
+          <p:cNvPr id="145" name="Elipse 144">
+            <a:extLst>
+              <a:ext uri="{FF2B5EF4-FFF2-40B4-BE49-F238E27FC236}">
+                <a16:creationId xmlns:a16="http://schemas.microsoft.com/office/drawing/2014/main" id="{873640B9-1480-4120-9558-51772B05FB3F}"/>
+              </a:ext>
+            </a:extLst>
+          </p:cNvPr>
+          <p:cNvSpPr/>
+          <p:nvPr/>
+        </p:nvSpPr>
+        <p:spPr>
+          <a:xfrm>
+            <a:off x="5315566" y="3832964"/>
+            <a:ext cx="1368657" cy="1338320"/>
+          </a:xfrm>
+          <a:prstGeom prst="ellipse">
+            <a:avLst/>
+          </a:prstGeom>
+          <a:solidFill>
+            <a:srgbClr val="DE7EA9"/>
+          </a:solidFill>
+          <a:ln>
+            <a:solidFill>
+              <a:srgbClr val="D8669A"/>
+            </a:solidFill>
+          </a:ln>
+        </p:spPr>
+        <p:style>
+          <a:lnRef idx="2">
+            <a:schemeClr val="accent1">
+              <a:shade val="50000"/>
+            </a:schemeClr>
+          </a:lnRef>
+          <a:fillRef idx="1">
+            <a:schemeClr val="accent1"/>
+          </a:fillRef>
+          <a:effectRef idx="0">
+            <a:schemeClr val="accent1"/>
+          </a:effectRef>
+          <a:fontRef idx="minor">
+            <a:schemeClr val="lt1"/>
+          </a:fontRef>
+        </p:style>
+        <p:txBody>
+          <a:bodyPr rtlCol="0" anchor="ctr"/>
+          <a:lstStyle/>
+          <a:p>
+            <a:pPr algn="ctr"/>
+            <a:endParaRPr lang="es-MX"/>
+          </a:p>
+        </p:txBody>
+      </p:sp>
+      <p:sp>
+        <p:nvSpPr>
+          <p:cNvPr id="147" name="CuadroTexto 146">
+            <a:extLst>
+              <a:ext uri="{FF2B5EF4-FFF2-40B4-BE49-F238E27FC236}">
+                <a16:creationId xmlns:a16="http://schemas.microsoft.com/office/drawing/2014/main" id="{0E3525A9-1AD3-4165-8BCD-9977048D9153}"/>
+              </a:ext>
+            </a:extLst>
+          </p:cNvPr>
+          <p:cNvSpPr txBox="1"/>
+          <p:nvPr/>
+        </p:nvSpPr>
+        <p:spPr>
+          <a:xfrm>
+            <a:off x="5253320" y="4300795"/>
+            <a:ext cx="1493150" cy="400110"/>
+          </a:xfrm>
+          <a:prstGeom prst="rect">
+            <a:avLst/>
+          </a:prstGeom>
+          <a:noFill/>
+        </p:spPr>
+        <p:txBody>
+          <a:bodyPr wrap="square" rtlCol="0">
+            <a:spAutoFit/>
+          </a:bodyPr>
+          <a:lstStyle/>
+          <a:p>
+            <a:pPr algn="ctr"/>
+            <a:r>
+              <a:rPr lang="es-MX" sz="2000" b="1" dirty="0">
+                <a:latin typeface="Century Gothic" panose="020B0502020202020204" pitchFamily="34" charset="0"/>
+              </a:rPr>
+              <a:t>Multiplicar</a:t>
+            </a:r>
+            <a:endParaRPr lang="es-MX" sz="1600" b="1" dirty="0">
+              <a:latin typeface="Century Gothic" panose="020B0502020202020204" pitchFamily="34" charset="0"/>
+            </a:endParaRPr>
+          </a:p>
+        </p:txBody>
+      </p:sp>
+      <p:sp>
+        <p:nvSpPr>
+          <p:cNvPr id="150" name="Elipse 149">
+            <a:extLst>
+              <a:ext uri="{FF2B5EF4-FFF2-40B4-BE49-F238E27FC236}">
+                <a16:creationId xmlns:a16="http://schemas.microsoft.com/office/drawing/2014/main" id="{0908A923-09B8-472F-A255-275AA8626849}"/>
+              </a:ext>
+            </a:extLst>
+          </p:cNvPr>
+          <p:cNvSpPr/>
+          <p:nvPr/>
+        </p:nvSpPr>
+        <p:spPr>
+          <a:xfrm>
+            <a:off x="7669267" y="3832964"/>
+            <a:ext cx="1368657" cy="1338320"/>
+          </a:xfrm>
+          <a:prstGeom prst="ellipse">
+            <a:avLst/>
+          </a:prstGeom>
+          <a:solidFill>
+            <a:srgbClr val="DE7EA9"/>
+          </a:solidFill>
+          <a:ln>
+            <a:solidFill>
+              <a:srgbClr val="D8669A"/>
+            </a:solidFill>
+          </a:ln>
+        </p:spPr>
+        <p:style>
+          <a:lnRef idx="2">
+            <a:schemeClr val="accent1">
+              <a:shade val="50000"/>
+            </a:schemeClr>
+          </a:lnRef>
+          <a:fillRef idx="1">
+            <a:schemeClr val="accent1"/>
+          </a:fillRef>
+          <a:effectRef idx="0">
+            <a:schemeClr val="accent1"/>
+          </a:effectRef>
+          <a:fontRef idx="minor">
+            <a:schemeClr val="lt1"/>
+          </a:fontRef>
+        </p:style>
+        <p:txBody>
+          <a:bodyPr rtlCol="0" anchor="ctr"/>
+          <a:lstStyle/>
+          <a:p>
+            <a:pPr algn="ctr"/>
+            <a:endParaRPr lang="es-MX"/>
+          </a:p>
+        </p:txBody>
+      </p:sp>
+      <p:sp>
+        <p:nvSpPr>
+          <p:cNvPr id="152" name="CuadroTexto 151">
+            <a:extLst>
+              <a:ext uri="{FF2B5EF4-FFF2-40B4-BE49-F238E27FC236}">
+                <a16:creationId xmlns:a16="http://schemas.microsoft.com/office/drawing/2014/main" id="{42EA7787-0C4B-4200-97AA-1537B0417760}"/>
+              </a:ext>
+            </a:extLst>
+          </p:cNvPr>
+          <p:cNvSpPr txBox="1"/>
+          <p:nvPr/>
+        </p:nvSpPr>
+        <p:spPr>
+          <a:xfrm>
+            <a:off x="7607020" y="4271291"/>
+            <a:ext cx="1493150" cy="369332"/>
+          </a:xfrm>
+          <a:prstGeom prst="rect">
+            <a:avLst/>
+          </a:prstGeom>
+          <a:noFill/>
+        </p:spPr>
+        <p:txBody>
+          <a:bodyPr wrap="square" rtlCol="0">
+            <a:spAutoFit/>
+          </a:bodyPr>
+          <a:lstStyle/>
+          <a:p>
+            <a:pPr algn="ctr"/>
+            <a:r>
+              <a:rPr lang="es-MX" b="1" dirty="0">
+                <a:latin typeface="Century Gothic" panose="020B0502020202020204" pitchFamily="34" charset="0"/>
+              </a:rPr>
+              <a:t>Transpuesta</a:t>
+            </a:r>
+            <a:endParaRPr lang="es-MX" sz="1400" b="1" dirty="0">
+              <a:latin typeface="Century Gothic" panose="020B0502020202020204" pitchFamily="34" charset="0"/>
+            </a:endParaRPr>
+          </a:p>
+        </p:txBody>
+      </p:sp>
+      <p:sp>
+        <p:nvSpPr>
+          <p:cNvPr id="157" name="Elipse 156">
+            <a:extLst>
+              <a:ext uri="{FF2B5EF4-FFF2-40B4-BE49-F238E27FC236}">
+                <a16:creationId xmlns:a16="http://schemas.microsoft.com/office/drawing/2014/main" id="{8B1E8BDA-58A5-4EEE-8A12-997365E94DCE}"/>
+              </a:ext>
+            </a:extLst>
+          </p:cNvPr>
+          <p:cNvSpPr/>
+          <p:nvPr/>
+        </p:nvSpPr>
+        <p:spPr>
+          <a:xfrm>
+            <a:off x="10109962" y="3832964"/>
+            <a:ext cx="1368657" cy="1338320"/>
+          </a:xfrm>
+          <a:prstGeom prst="ellipse">
+            <a:avLst/>
+          </a:prstGeom>
+          <a:solidFill>
+            <a:srgbClr val="DE7EA9"/>
+          </a:solidFill>
+          <a:ln>
+            <a:solidFill>
+              <a:srgbClr val="D8669A"/>
+            </a:solidFill>
+          </a:ln>
+        </p:spPr>
+        <p:style>
+          <a:lnRef idx="2">
+            <a:schemeClr val="accent1">
+              <a:shade val="50000"/>
+            </a:schemeClr>
+          </a:lnRef>
+          <a:fillRef idx="1">
+            <a:schemeClr val="accent1"/>
+          </a:fillRef>
+          <a:effectRef idx="0">
+            <a:schemeClr val="accent1"/>
+          </a:effectRef>
+          <a:fontRef idx="minor">
+            <a:schemeClr val="lt1"/>
+          </a:fontRef>
+        </p:style>
+        <p:txBody>
+          <a:bodyPr rtlCol="0" anchor="ctr"/>
+          <a:lstStyle/>
+          <a:p>
+            <a:pPr algn="ctr"/>
+            <a:endParaRPr lang="es-MX"/>
+          </a:p>
+        </p:txBody>
+      </p:sp>
+      <p:sp>
+        <p:nvSpPr>
+          <p:cNvPr id="158" name="CuadroTexto 157">
+            <a:extLst>
+              <a:ext uri="{FF2B5EF4-FFF2-40B4-BE49-F238E27FC236}">
+                <a16:creationId xmlns:a16="http://schemas.microsoft.com/office/drawing/2014/main" id="{C4792EAB-4A19-489F-900A-BD4DDA20DCF2}"/>
+              </a:ext>
+            </a:extLst>
+          </p:cNvPr>
+          <p:cNvSpPr txBox="1"/>
+          <p:nvPr/>
+        </p:nvSpPr>
+        <p:spPr>
+          <a:xfrm>
+            <a:off x="10047715" y="4271291"/>
+            <a:ext cx="1493150" cy="461665"/>
+          </a:xfrm>
+          <a:prstGeom prst="rect">
+            <a:avLst/>
+          </a:prstGeom>
+          <a:noFill/>
+        </p:spPr>
+        <p:txBody>
+          <a:bodyPr wrap="square" rtlCol="0">
+            <a:spAutoFit/>
+          </a:bodyPr>
+          <a:lstStyle/>
+          <a:p>
+            <a:pPr algn="ctr"/>
+            <a:r>
+              <a:rPr lang="es-MX" sz="2400" b="1" dirty="0">
+                <a:latin typeface="Century Gothic" panose="020B0502020202020204" pitchFamily="34" charset="0"/>
+              </a:rPr>
+              <a:t>Inversa</a:t>
+            </a:r>
+            <a:endParaRPr lang="es-MX" b="1" dirty="0">
+              <a:latin typeface="Century Gothic" panose="020B0502020202020204" pitchFamily="34" charset="0"/>
+            </a:endParaRPr>
+          </a:p>
+        </p:txBody>
+      </p:sp>
+      <p:cxnSp>
+        <p:nvCxnSpPr>
+          <p:cNvPr id="165" name="Conector recto 164">
+            <a:extLst>
+              <a:ext uri="{FF2B5EF4-FFF2-40B4-BE49-F238E27FC236}">
+                <a16:creationId xmlns:a16="http://schemas.microsoft.com/office/drawing/2014/main" id="{3FC76833-5A2E-49D0-AA04-C755724D0324}"/>
+              </a:ext>
+            </a:extLst>
+          </p:cNvPr>
+          <p:cNvCxnSpPr>
+            <a:cxnSpLocks/>
+          </p:cNvCxnSpPr>
+          <p:nvPr/>
+        </p:nvCxnSpPr>
+        <p:spPr>
+          <a:xfrm flipV="1">
+            <a:off x="3776896" y="1306182"/>
+            <a:ext cx="2240748" cy="2550690"/>
+          </a:xfrm>
+          <a:prstGeom prst="line">
+            <a:avLst/>
+          </a:prstGeom>
+          <a:ln w="38100">
+            <a:solidFill>
+              <a:schemeClr val="tx1"/>
+            </a:solidFill>
+          </a:ln>
+        </p:spPr>
+        <p:style>
+          <a:lnRef idx="1">
+            <a:schemeClr val="accent1"/>
+          </a:lnRef>
+          <a:fillRef idx="0">
+            <a:schemeClr val="accent1"/>
+          </a:fillRef>
+          <a:effectRef idx="0">
+            <a:schemeClr val="accent1"/>
+          </a:effectRef>
+          <a:fontRef idx="minor">
+            <a:schemeClr val="tx1"/>
+          </a:fontRef>
+        </p:style>
+      </p:cxnSp>
+      <p:cxnSp>
+        <p:nvCxnSpPr>
+          <p:cNvPr id="166" name="Conector recto 165">
+            <a:extLst>
+              <a:ext uri="{FF2B5EF4-FFF2-40B4-BE49-F238E27FC236}">
+                <a16:creationId xmlns:a16="http://schemas.microsoft.com/office/drawing/2014/main" id="{B9AE571A-745F-4529-A2F8-F938EF1D6D67}"/>
+              </a:ext>
+            </a:extLst>
+          </p:cNvPr>
+          <p:cNvCxnSpPr>
+            <a:cxnSpLocks/>
+            <a:endCxn id="145" idx="0"/>
+          </p:cNvCxnSpPr>
+          <p:nvPr/>
+        </p:nvCxnSpPr>
+        <p:spPr>
+          <a:xfrm>
+            <a:off x="5991746" y="1303361"/>
+            <a:ext cx="8149" cy="2529603"/>
+          </a:xfrm>
+          <a:prstGeom prst="line">
+            <a:avLst/>
+          </a:prstGeom>
+          <a:ln w="38100">
+            <a:solidFill>
+              <a:schemeClr val="tx1"/>
+            </a:solidFill>
+          </a:ln>
+        </p:spPr>
+        <p:style>
+          <a:lnRef idx="1">
+            <a:schemeClr val="accent1"/>
+          </a:lnRef>
+          <a:fillRef idx="0">
+            <a:schemeClr val="accent1"/>
+          </a:fillRef>
+          <a:effectRef idx="0">
+            <a:schemeClr val="accent1"/>
+          </a:effectRef>
+          <a:fontRef idx="minor">
+            <a:schemeClr val="tx1"/>
+          </a:fontRef>
+        </p:style>
+      </p:cxnSp>
+      <p:cxnSp>
+        <p:nvCxnSpPr>
+          <p:cNvPr id="168" name="Conector recto 167">
+            <a:extLst>
+              <a:ext uri="{FF2B5EF4-FFF2-40B4-BE49-F238E27FC236}">
+                <a16:creationId xmlns:a16="http://schemas.microsoft.com/office/drawing/2014/main" id="{15C0E391-75DC-46E3-829D-D30374840049}"/>
+              </a:ext>
+            </a:extLst>
+          </p:cNvPr>
+          <p:cNvCxnSpPr>
+            <a:cxnSpLocks/>
+            <a:stCxn id="150" idx="0"/>
+          </p:cNvCxnSpPr>
+          <p:nvPr/>
+        </p:nvCxnSpPr>
+        <p:spPr>
+          <a:xfrm flipH="1" flipV="1">
+            <a:off x="6036243" y="1374708"/>
+            <a:ext cx="2317353" cy="2458256"/>
+          </a:xfrm>
+          <a:prstGeom prst="line">
+            <a:avLst/>
+          </a:prstGeom>
+          <a:ln w="38100">
+            <a:solidFill>
+              <a:schemeClr val="tx1"/>
+            </a:solidFill>
+          </a:ln>
+        </p:spPr>
+        <p:style>
+          <a:lnRef idx="1">
+            <a:schemeClr val="accent1"/>
+          </a:lnRef>
+          <a:fillRef idx="0">
+            <a:schemeClr val="accent1"/>
+          </a:fillRef>
+          <a:effectRef idx="0">
+            <a:schemeClr val="accent1"/>
+          </a:effectRef>
+          <a:fontRef idx="minor">
+            <a:schemeClr val="tx1"/>
+          </a:fontRef>
+        </p:style>
+      </p:cxnSp>
+      <p:cxnSp>
+        <p:nvCxnSpPr>
+          <p:cNvPr id="169" name="Conector recto 168">
+            <a:extLst>
+              <a:ext uri="{FF2B5EF4-FFF2-40B4-BE49-F238E27FC236}">
+                <a16:creationId xmlns:a16="http://schemas.microsoft.com/office/drawing/2014/main" id="{9058E7D1-F57F-480B-87D0-80E627C26757}"/>
+              </a:ext>
+            </a:extLst>
+          </p:cNvPr>
+          <p:cNvCxnSpPr>
+            <a:cxnSpLocks/>
+            <a:endCxn id="157" idx="0"/>
+          </p:cNvCxnSpPr>
+          <p:nvPr/>
+        </p:nvCxnSpPr>
+        <p:spPr>
+          <a:xfrm>
+            <a:off x="6014570" y="1371887"/>
+            <a:ext cx="4779721" cy="2461077"/>
+          </a:xfrm>
+          <a:prstGeom prst="line">
+            <a:avLst/>
+          </a:prstGeom>
+          <a:ln w="38100">
+            <a:solidFill>
+              <a:schemeClr val="tx1"/>
+            </a:solidFill>
+          </a:ln>
+        </p:spPr>
+        <p:style>
+          <a:lnRef idx="1">
+            <a:schemeClr val="accent1"/>
+          </a:lnRef>
+          <a:fillRef idx="0">
+            <a:schemeClr val="accent1"/>
+          </a:fillRef>
+          <a:effectRef idx="0">
+            <a:schemeClr val="accent1"/>
+          </a:effectRef>
+          <a:fontRef idx="minor">
+            <a:schemeClr val="tx1"/>
+          </a:fontRef>
+        </p:style>
+      </p:cxnSp>
+    </p:spTree>
+    <p:extLst>
+      <p:ext uri="{BB962C8B-B14F-4D97-AF65-F5344CB8AC3E}">
+        <p14:creationId xmlns:p14="http://schemas.microsoft.com/office/powerpoint/2010/main" val="3523506875"/>
+      </p:ext>
+    </p:extLst>
+  </p:cSld>
+  <p:clrMapOvr>
+    <a:masterClrMapping/>
+  </p:clrMapOvr>
+</p:sld>
+</file>
+
+<file path=ppt/slides/slide3.xml><?xml version="1.0" encoding="utf-8"?>
+<p:sld xmlns:a="http://schemas.openxmlformats.org/drawingml/2006/main" xmlns:r="http://schemas.openxmlformats.org/officeDocument/2006/relationships" xmlns:p="http://schemas.openxmlformats.org/presentationml/2006/main">
+  <p:cSld>
+    <p:spTree>
+      <p:nvGrpSpPr>
+        <p:cNvPr id="1" name=""/>
+        <p:cNvGrpSpPr/>
+        <p:nvPr/>
+      </p:nvGrpSpPr>
+      <p:grpSpPr>
+        <a:xfrm>
+          <a:off x="0" y="0"/>
+          <a:ext cx="0" cy="0"/>
+          <a:chOff x="0" y="0"/>
+          <a:chExt cx="0" cy="0"/>
+        </a:xfrm>
+      </p:grpSpPr>
+      <p:cxnSp>
+        <p:nvCxnSpPr>
+          <p:cNvPr id="4" name="Conector recto 3">
+            <a:extLst>
+              <a:ext uri="{FF2B5EF4-FFF2-40B4-BE49-F238E27FC236}">
+                <a16:creationId xmlns:a16="http://schemas.microsoft.com/office/drawing/2014/main" id="{5A3819AB-78C3-4394-8CA2-0F3AD74438B9}"/>
+              </a:ext>
+            </a:extLst>
+          </p:cNvPr>
+          <p:cNvCxnSpPr>
+            <a:cxnSpLocks/>
+          </p:cNvCxnSpPr>
+          <p:nvPr/>
+        </p:nvCxnSpPr>
+        <p:spPr>
+          <a:xfrm>
+            <a:off x="5380808" y="1009795"/>
+            <a:ext cx="1288864" cy="0"/>
+          </a:xfrm>
+          <a:prstGeom prst="line">
+            <a:avLst/>
+          </a:prstGeom>
+          <a:ln w="76200">
+            <a:solidFill>
+              <a:schemeClr val="tx1"/>
+            </a:solidFill>
+          </a:ln>
+        </p:spPr>
+        <p:style>
+          <a:lnRef idx="1">
+            <a:schemeClr val="accent1"/>
+          </a:lnRef>
+          <a:fillRef idx="0">
+            <a:schemeClr val="accent1"/>
+          </a:fillRef>
+          <a:effectRef idx="0">
+            <a:schemeClr val="accent1"/>
+          </a:effectRef>
+          <a:fontRef idx="minor">
+            <a:schemeClr val="tx1"/>
+          </a:fontRef>
+        </p:style>
+      </p:cxnSp>
+      <p:sp>
+        <p:nvSpPr>
+          <p:cNvPr id="5" name="CuadroTexto 4">
+            <a:extLst>
+              <a:ext uri="{FF2B5EF4-FFF2-40B4-BE49-F238E27FC236}">
+                <a16:creationId xmlns:a16="http://schemas.microsoft.com/office/drawing/2014/main" id="{14DE791A-F243-4DF3-89FB-6E45C3D562B1}"/>
+              </a:ext>
+            </a:extLst>
+          </p:cNvPr>
+          <p:cNvSpPr txBox="1"/>
+          <p:nvPr/>
+        </p:nvSpPr>
+        <p:spPr>
+          <a:xfrm>
+            <a:off x="5489265" y="423123"/>
+            <a:ext cx="1180407" cy="523220"/>
+          </a:xfrm>
+          <a:prstGeom prst="rect">
+            <a:avLst/>
+          </a:prstGeom>
+          <a:noFill/>
+        </p:spPr>
+        <p:txBody>
+          <a:bodyPr wrap="square" rtlCol="0">
+            <a:spAutoFit/>
+          </a:bodyPr>
+          <a:lstStyle/>
+          <a:p>
+            <a:r>
+              <a:rPr lang="es-MX" sz="2800" b="1" dirty="0">
+                <a:latin typeface="Century Gothic" panose="020B0502020202020204" pitchFamily="34" charset="0"/>
+              </a:rPr>
+              <a:t>main</a:t>
+            </a:r>
+            <a:endParaRPr lang="es-MX" b="1" dirty="0">
+              <a:latin typeface="Century Gothic" panose="020B0502020202020204" pitchFamily="34" charset="0"/>
+            </a:endParaRPr>
+          </a:p>
+        </p:txBody>
+      </p:sp>
+      <p:cxnSp>
+        <p:nvCxnSpPr>
+          <p:cNvPr id="6" name="Conector recto 5">
+            <a:extLst>
+              <a:ext uri="{FF2B5EF4-FFF2-40B4-BE49-F238E27FC236}">
+                <a16:creationId xmlns:a16="http://schemas.microsoft.com/office/drawing/2014/main" id="{373571E9-824B-462A-BFBA-A1AC8D9FE724}"/>
+              </a:ext>
+            </a:extLst>
+          </p:cNvPr>
+          <p:cNvCxnSpPr>
+            <a:cxnSpLocks/>
+          </p:cNvCxnSpPr>
+          <p:nvPr/>
+        </p:nvCxnSpPr>
+        <p:spPr>
+          <a:xfrm>
+            <a:off x="5999895" y="1009795"/>
+            <a:ext cx="0" cy="367734"/>
+          </a:xfrm>
+          <a:prstGeom prst="line">
+            <a:avLst/>
+          </a:prstGeom>
+          <a:ln w="76200">
+            <a:solidFill>
+              <a:schemeClr val="tx1"/>
+            </a:solidFill>
+          </a:ln>
+        </p:spPr>
+        <p:style>
+          <a:lnRef idx="1">
+            <a:schemeClr val="accent1"/>
+          </a:lnRef>
+          <a:fillRef idx="0">
+            <a:schemeClr val="accent1"/>
+          </a:fillRef>
+          <a:effectRef idx="0">
+            <a:schemeClr val="accent1"/>
+          </a:effectRef>
+          <a:fontRef idx="minor">
+            <a:schemeClr val="tx1"/>
+          </a:fontRef>
+        </p:style>
+      </p:cxnSp>
+      <p:sp>
+        <p:nvSpPr>
+          <p:cNvPr id="7" name="Elipse 6">
+            <a:extLst>
+              <a:ext uri="{FF2B5EF4-FFF2-40B4-BE49-F238E27FC236}">
+                <a16:creationId xmlns:a16="http://schemas.microsoft.com/office/drawing/2014/main" id="{DEBCF0D5-C797-4305-9A42-EE8429A991EE}"/>
+              </a:ext>
+            </a:extLst>
+          </p:cNvPr>
+          <p:cNvSpPr/>
+          <p:nvPr/>
+        </p:nvSpPr>
+        <p:spPr>
+          <a:xfrm>
+            <a:off x="3509931" y="3796637"/>
+            <a:ext cx="1368657" cy="1338320"/>
+          </a:xfrm>
+          <a:prstGeom prst="ellipse">
+            <a:avLst/>
+          </a:prstGeom>
+          <a:solidFill>
+            <a:srgbClr val="DE7EA9"/>
+          </a:solidFill>
+          <a:ln>
+            <a:solidFill>
+              <a:srgbClr val="D8669A"/>
+            </a:solidFill>
+          </a:ln>
+        </p:spPr>
+        <p:style>
+          <a:lnRef idx="2">
+            <a:schemeClr val="accent1">
+              <a:shade val="50000"/>
+            </a:schemeClr>
+          </a:lnRef>
+          <a:fillRef idx="1">
+            <a:schemeClr val="accent1"/>
+          </a:fillRef>
+          <a:effectRef idx="0">
+            <a:schemeClr val="accent1"/>
+          </a:effectRef>
+          <a:fontRef idx="minor">
+            <a:schemeClr val="lt1"/>
+          </a:fontRef>
+        </p:style>
+        <p:txBody>
+          <a:bodyPr rtlCol="0" anchor="ctr"/>
+          <a:lstStyle/>
+          <a:p>
+            <a:pPr algn="ctr"/>
+            <a:endParaRPr lang="es-MX"/>
+          </a:p>
+        </p:txBody>
+      </p:sp>
+      <p:sp>
+        <p:nvSpPr>
+          <p:cNvPr id="8" name="Elipse 7">
+            <a:extLst>
+              <a:ext uri="{FF2B5EF4-FFF2-40B4-BE49-F238E27FC236}">
+                <a16:creationId xmlns:a16="http://schemas.microsoft.com/office/drawing/2014/main" id="{C53FE16E-98E7-465B-B342-9808A1823794}"/>
               </a:ext>
             </a:extLst>
           </p:cNvPr>
@@ -7814,23 +8682,24 @@
       </p:sp>
       <p:cxnSp>
         <p:nvCxnSpPr>
-          <p:cNvPr id="25" name="Conector recto 24">
-            <a:extLst>
-              <a:ext uri="{FF2B5EF4-FFF2-40B4-BE49-F238E27FC236}">
-                <a16:creationId xmlns:a16="http://schemas.microsoft.com/office/drawing/2014/main" id="{B0FD8281-375C-402B-9270-69A7E2DE5C7C}"/>
+          <p:cNvPr id="9" name="Conector recto 8">
+            <a:extLst>
+              <a:ext uri="{FF2B5EF4-FFF2-40B4-BE49-F238E27FC236}">
+                <a16:creationId xmlns:a16="http://schemas.microsoft.com/office/drawing/2014/main" id="{A4980974-3B15-49A3-9953-A8C9A8376031}"/>
               </a:ext>
             </a:extLst>
           </p:cNvPr>
           <p:cNvCxnSpPr>
             <a:cxnSpLocks/>
-            <a:endCxn id="124" idx="1"/>
+            <a:stCxn id="7" idx="0"/>
+            <a:endCxn id="8" idx="2"/>
           </p:cNvCxnSpPr>
           <p:nvPr/>
         </p:nvCxnSpPr>
         <p:spPr>
           <a:xfrm flipV="1">
-            <a:off x="1536826" y="2054924"/>
-            <a:ext cx="3708345" cy="1917160"/>
+            <a:off x="4194260" y="2090537"/>
+            <a:ext cx="1031852" cy="1706100"/>
           </a:xfrm>
           <a:prstGeom prst="line">
             <a:avLst/>
@@ -7858,10 +8727,10 @@
       </p:cxnSp>
       <p:sp>
         <p:nvSpPr>
-          <p:cNvPr id="124" name="CuadroTexto 123">
-            <a:extLst>
-              <a:ext uri="{FF2B5EF4-FFF2-40B4-BE49-F238E27FC236}">
-                <a16:creationId xmlns:a16="http://schemas.microsoft.com/office/drawing/2014/main" id="{6D6A66A6-71A1-4896-80B3-A3519E91AB3D}"/>
+          <p:cNvPr id="10" name="CuadroTexto 9">
+            <a:extLst>
+              <a:ext uri="{FF2B5EF4-FFF2-40B4-BE49-F238E27FC236}">
+                <a16:creationId xmlns:a16="http://schemas.microsoft.com/office/drawing/2014/main" id="{FD1C9D28-A690-4251-A6E7-1064C2702112}"/>
               </a:ext>
             </a:extLst>
           </p:cNvPr>
@@ -7889,7 +8758,7 @@
               <a:rPr lang="es-MX" sz="2400" b="1" dirty="0">
                 <a:latin typeface="Century Gothic" panose="020B0502020202020204" pitchFamily="34" charset="0"/>
               </a:rPr>
-              <a:t>Leer archivos</a:t>
+              <a:t>Primer Hijo</a:t>
             </a:r>
             <a:endParaRPr lang="es-MX" b="1" dirty="0">
               <a:latin typeface="Century Gothic" panose="020B0502020202020204" pitchFamily="34" charset="0"/>
@@ -7899,10 +8768,10 @@
       </p:sp>
       <p:sp>
         <p:nvSpPr>
-          <p:cNvPr id="126" name="CuadroTexto 125">
-            <a:extLst>
-              <a:ext uri="{FF2B5EF4-FFF2-40B4-BE49-F238E27FC236}">
-                <a16:creationId xmlns:a16="http://schemas.microsoft.com/office/drawing/2014/main" id="{AE1F9CBA-DD73-4516-83C9-1358C3C4AFCA}"/>
+          <p:cNvPr id="11" name="CuadroTexto 10">
+            <a:extLst>
+              <a:ext uri="{FF2B5EF4-FFF2-40B4-BE49-F238E27FC236}">
+                <a16:creationId xmlns:a16="http://schemas.microsoft.com/office/drawing/2014/main" id="{864F16FD-2CFA-43FE-BD30-0F387C9A36E6}"/>
               </a:ext>
             </a:extLst>
           </p:cNvPr>
@@ -7911,8 +8780,8 @@
         </p:nvSpPr>
         <p:spPr>
           <a:xfrm>
-            <a:off x="447758" y="4300795"/>
-            <a:ext cx="1493150" cy="461665"/>
+            <a:off x="3447685" y="4138805"/>
+            <a:ext cx="1493150" cy="646331"/>
           </a:xfrm>
           <a:prstGeom prst="rect">
             <a:avLst/>
@@ -7927,12 +8796,12 @@
           <a:p>
             <a:pPr algn="ctr"/>
             <a:r>
-              <a:rPr lang="es-MX" sz="2400" b="1" dirty="0">
+              <a:rPr lang="es-MX" b="1" dirty="0">
                 <a:latin typeface="Century Gothic" panose="020B0502020202020204" pitchFamily="34" charset="0"/>
               </a:rPr>
-              <a:t>Sumar</a:t>
-            </a:r>
-            <a:endParaRPr lang="es-MX" b="1" dirty="0">
+              <a:t>Expresión Aritmética</a:t>
+            </a:r>
+            <a:endParaRPr lang="es-MX" sz="1400" b="1" dirty="0">
               <a:latin typeface="Century Gothic" panose="020B0502020202020204" pitchFamily="34" charset="0"/>
             </a:endParaRPr>
           </a:p>
@@ -7940,10 +8809,10 @@
       </p:sp>
       <p:sp>
         <p:nvSpPr>
-          <p:cNvPr id="143" name="Elipse 142">
-            <a:extLst>
-              <a:ext uri="{FF2B5EF4-FFF2-40B4-BE49-F238E27FC236}">
-                <a16:creationId xmlns:a16="http://schemas.microsoft.com/office/drawing/2014/main" id="{C52DEBF3-6F38-46B1-A2C9-B54C87FB49B7}"/>
+          <p:cNvPr id="12" name="Elipse 11">
+            <a:extLst>
+              <a:ext uri="{FF2B5EF4-FFF2-40B4-BE49-F238E27FC236}">
+                <a16:creationId xmlns:a16="http://schemas.microsoft.com/office/drawing/2014/main" id="{8F21D978-240B-4052-A514-9A5C9F52982C}"/>
               </a:ext>
             </a:extLst>
           </p:cNvPr>
@@ -7952,7 +8821,7 @@
         </p:nvSpPr>
         <p:spPr>
           <a:xfrm>
-            <a:off x="2899619" y="3832964"/>
+            <a:off x="5313192" y="3796637"/>
             <a:ext cx="1368657" cy="1338320"/>
           </a:xfrm>
           <a:prstGeom prst="ellipse">
@@ -7994,10 +8863,10 @@
       </p:sp>
       <p:sp>
         <p:nvSpPr>
-          <p:cNvPr id="144" name="CuadroTexto 143">
-            <a:extLst>
-              <a:ext uri="{FF2B5EF4-FFF2-40B4-BE49-F238E27FC236}">
-                <a16:creationId xmlns:a16="http://schemas.microsoft.com/office/drawing/2014/main" id="{044DB7F7-6524-4983-8971-E9CB343AFDD4}"/>
+          <p:cNvPr id="13" name="CuadroTexto 12">
+            <a:extLst>
+              <a:ext uri="{FF2B5EF4-FFF2-40B4-BE49-F238E27FC236}">
+                <a16:creationId xmlns:a16="http://schemas.microsoft.com/office/drawing/2014/main" id="{A6725359-C6A0-41BC-9E2F-D298E0143EE8}"/>
               </a:ext>
             </a:extLst>
           </p:cNvPr>
@@ -8006,8 +8875,8 @@
         </p:nvSpPr>
         <p:spPr>
           <a:xfrm>
-            <a:off x="2837372" y="4271291"/>
-            <a:ext cx="1493150" cy="461665"/>
+            <a:off x="5240580" y="4138805"/>
+            <a:ext cx="1493150" cy="707886"/>
           </a:xfrm>
           <a:prstGeom prst="rect">
             <a:avLst/>
@@ -8022,12 +8891,12 @@
           <a:p>
             <a:pPr algn="ctr"/>
             <a:r>
-              <a:rPr lang="es-MX" sz="2400" b="1" dirty="0">
+              <a:rPr lang="es-MX" sz="2000" b="1" dirty="0">
                 <a:latin typeface="Century Gothic" panose="020B0502020202020204" pitchFamily="34" charset="0"/>
               </a:rPr>
-              <a:t>Restar</a:t>
-            </a:r>
-            <a:endParaRPr lang="es-MX" b="1" dirty="0">
+              <a:t>Permisos archivos</a:t>
+            </a:r>
+            <a:endParaRPr lang="es-MX" sz="1600" b="1" dirty="0">
               <a:latin typeface="Century Gothic" panose="020B0502020202020204" pitchFamily="34" charset="0"/>
             </a:endParaRPr>
           </a:p>
@@ -8035,10 +8904,10 @@
       </p:sp>
       <p:sp>
         <p:nvSpPr>
-          <p:cNvPr id="145" name="Elipse 144">
-            <a:extLst>
-              <a:ext uri="{FF2B5EF4-FFF2-40B4-BE49-F238E27FC236}">
-                <a16:creationId xmlns:a16="http://schemas.microsoft.com/office/drawing/2014/main" id="{873640B9-1480-4120-9558-51772B05FB3F}"/>
+          <p:cNvPr id="14" name="Elipse 13">
+            <a:extLst>
+              <a:ext uri="{FF2B5EF4-FFF2-40B4-BE49-F238E27FC236}">
+                <a16:creationId xmlns:a16="http://schemas.microsoft.com/office/drawing/2014/main" id="{0B741825-5D22-4A34-BE97-378714D25052}"/>
               </a:ext>
             </a:extLst>
           </p:cNvPr>
@@ -8047,7 +8916,7 @@
         </p:nvSpPr>
         <p:spPr>
           <a:xfrm>
-            <a:off x="5315566" y="3832964"/>
+            <a:off x="7168334" y="3796637"/>
             <a:ext cx="1368657" cy="1338320"/>
           </a:xfrm>
           <a:prstGeom prst="ellipse">
@@ -8089,10 +8958,10 @@
       </p:sp>
       <p:sp>
         <p:nvSpPr>
-          <p:cNvPr id="147" name="CuadroTexto 146">
-            <a:extLst>
-              <a:ext uri="{FF2B5EF4-FFF2-40B4-BE49-F238E27FC236}">
-                <a16:creationId xmlns:a16="http://schemas.microsoft.com/office/drawing/2014/main" id="{0E3525A9-1AD3-4165-8BCD-9977048D9153}"/>
+          <p:cNvPr id="15" name="CuadroTexto 14">
+            <a:extLst>
+              <a:ext uri="{FF2B5EF4-FFF2-40B4-BE49-F238E27FC236}">
+                <a16:creationId xmlns:a16="http://schemas.microsoft.com/office/drawing/2014/main" id="{548B5515-8390-43EB-9659-EA9F3EFF172E}"/>
               </a:ext>
             </a:extLst>
           </p:cNvPr>
@@ -8101,8 +8970,8 @@
         </p:nvSpPr>
         <p:spPr>
           <a:xfrm>
-            <a:off x="5253320" y="4300795"/>
-            <a:ext cx="1493150" cy="400110"/>
+            <a:off x="7106087" y="4113402"/>
+            <a:ext cx="1493150" cy="707886"/>
           </a:xfrm>
           <a:prstGeom prst="rect">
             <a:avLst/>
@@ -8120,7 +8989,7 @@
               <a:rPr lang="es-MX" sz="2000" b="1" dirty="0">
                 <a:latin typeface="Century Gothic" panose="020B0502020202020204" pitchFamily="34" charset="0"/>
               </a:rPr>
-              <a:t>Multiplicar</a:t>
+              <a:t>Inversas matrices</a:t>
             </a:r>
             <a:endParaRPr lang="es-MX" sz="1600" b="1" dirty="0">
               <a:latin typeface="Century Gothic" panose="020B0502020202020204" pitchFamily="34" charset="0"/>
@@ -8128,215 +8997,26 @@
           </a:p>
         </p:txBody>
       </p:sp>
-      <p:sp>
-        <p:nvSpPr>
-          <p:cNvPr id="150" name="Elipse 149">
-            <a:extLst>
-              <a:ext uri="{FF2B5EF4-FFF2-40B4-BE49-F238E27FC236}">
-                <a16:creationId xmlns:a16="http://schemas.microsoft.com/office/drawing/2014/main" id="{0908A923-09B8-472F-A255-275AA8626849}"/>
-              </a:ext>
-            </a:extLst>
-          </p:cNvPr>
-          <p:cNvSpPr/>
-          <p:nvPr/>
-        </p:nvSpPr>
-        <p:spPr>
-          <a:xfrm>
-            <a:off x="7669267" y="3832964"/>
-            <a:ext cx="1368657" cy="1338320"/>
-          </a:xfrm>
-          <a:prstGeom prst="ellipse">
-            <a:avLst/>
-          </a:prstGeom>
-          <a:solidFill>
-            <a:srgbClr val="DE7EA9"/>
-          </a:solidFill>
-          <a:ln>
-            <a:solidFill>
-              <a:srgbClr val="D8669A"/>
-            </a:solidFill>
-          </a:ln>
-        </p:spPr>
-        <p:style>
-          <a:lnRef idx="2">
-            <a:schemeClr val="accent1">
-              <a:shade val="50000"/>
-            </a:schemeClr>
-          </a:lnRef>
-          <a:fillRef idx="1">
-            <a:schemeClr val="accent1"/>
-          </a:fillRef>
-          <a:effectRef idx="0">
-            <a:schemeClr val="accent1"/>
-          </a:effectRef>
-          <a:fontRef idx="minor">
-            <a:schemeClr val="lt1"/>
-          </a:fontRef>
-        </p:style>
-        <p:txBody>
-          <a:bodyPr rtlCol="0" anchor="ctr"/>
-          <a:lstStyle/>
-          <a:p>
-            <a:pPr algn="ctr"/>
-            <a:endParaRPr lang="es-MX"/>
-          </a:p>
-        </p:txBody>
-      </p:sp>
-      <p:sp>
-        <p:nvSpPr>
-          <p:cNvPr id="152" name="CuadroTexto 151">
-            <a:extLst>
-              <a:ext uri="{FF2B5EF4-FFF2-40B4-BE49-F238E27FC236}">
-                <a16:creationId xmlns:a16="http://schemas.microsoft.com/office/drawing/2014/main" id="{42EA7787-0C4B-4200-97AA-1537B0417760}"/>
-              </a:ext>
-            </a:extLst>
-          </p:cNvPr>
-          <p:cNvSpPr txBox="1"/>
-          <p:nvPr/>
-        </p:nvSpPr>
-        <p:spPr>
-          <a:xfrm>
-            <a:off x="7607020" y="4271291"/>
-            <a:ext cx="1493150" cy="369332"/>
-          </a:xfrm>
-          <a:prstGeom prst="rect">
-            <a:avLst/>
-          </a:prstGeom>
-          <a:noFill/>
-        </p:spPr>
-        <p:txBody>
-          <a:bodyPr wrap="square" rtlCol="0">
-            <a:spAutoFit/>
-          </a:bodyPr>
-          <a:lstStyle/>
-          <a:p>
-            <a:pPr algn="ctr"/>
-            <a:r>
-              <a:rPr lang="es-MX" b="1" dirty="0">
-                <a:latin typeface="Century Gothic" panose="020B0502020202020204" pitchFamily="34" charset="0"/>
-              </a:rPr>
-              <a:t>Transpuesta</a:t>
-            </a:r>
-            <a:endParaRPr lang="es-MX" sz="1400" b="1" dirty="0">
-              <a:latin typeface="Century Gothic" panose="020B0502020202020204" pitchFamily="34" charset="0"/>
-            </a:endParaRPr>
-          </a:p>
-        </p:txBody>
-      </p:sp>
-      <p:sp>
-        <p:nvSpPr>
-          <p:cNvPr id="157" name="Elipse 156">
-            <a:extLst>
-              <a:ext uri="{FF2B5EF4-FFF2-40B4-BE49-F238E27FC236}">
-                <a16:creationId xmlns:a16="http://schemas.microsoft.com/office/drawing/2014/main" id="{8B1E8BDA-58A5-4EEE-8A12-997365E94DCE}"/>
-              </a:ext>
-            </a:extLst>
-          </p:cNvPr>
-          <p:cNvSpPr/>
-          <p:nvPr/>
-        </p:nvSpPr>
-        <p:spPr>
-          <a:xfrm>
-            <a:off x="10109962" y="3832964"/>
-            <a:ext cx="1368657" cy="1338320"/>
-          </a:xfrm>
-          <a:prstGeom prst="ellipse">
-            <a:avLst/>
-          </a:prstGeom>
-          <a:solidFill>
-            <a:srgbClr val="DE7EA9"/>
-          </a:solidFill>
-          <a:ln>
-            <a:solidFill>
-              <a:srgbClr val="D8669A"/>
-            </a:solidFill>
-          </a:ln>
-        </p:spPr>
-        <p:style>
-          <a:lnRef idx="2">
-            <a:schemeClr val="accent1">
-              <a:shade val="50000"/>
-            </a:schemeClr>
-          </a:lnRef>
-          <a:fillRef idx="1">
-            <a:schemeClr val="accent1"/>
-          </a:fillRef>
-          <a:effectRef idx="0">
-            <a:schemeClr val="accent1"/>
-          </a:effectRef>
-          <a:fontRef idx="minor">
-            <a:schemeClr val="lt1"/>
-          </a:fontRef>
-        </p:style>
-        <p:txBody>
-          <a:bodyPr rtlCol="0" anchor="ctr"/>
-          <a:lstStyle/>
-          <a:p>
-            <a:pPr algn="ctr"/>
-            <a:endParaRPr lang="es-MX"/>
-          </a:p>
-        </p:txBody>
-      </p:sp>
-      <p:sp>
-        <p:nvSpPr>
-          <p:cNvPr id="158" name="CuadroTexto 157">
-            <a:extLst>
-              <a:ext uri="{FF2B5EF4-FFF2-40B4-BE49-F238E27FC236}">
-                <a16:creationId xmlns:a16="http://schemas.microsoft.com/office/drawing/2014/main" id="{C4792EAB-4A19-489F-900A-BD4DDA20DCF2}"/>
-              </a:ext>
-            </a:extLst>
-          </p:cNvPr>
-          <p:cNvSpPr txBox="1"/>
-          <p:nvPr/>
-        </p:nvSpPr>
-        <p:spPr>
-          <a:xfrm>
-            <a:off x="10047715" y="4271291"/>
-            <a:ext cx="1493150" cy="461665"/>
-          </a:xfrm>
-          <a:prstGeom prst="rect">
-            <a:avLst/>
-          </a:prstGeom>
-          <a:noFill/>
-        </p:spPr>
-        <p:txBody>
-          <a:bodyPr wrap="square" rtlCol="0">
-            <a:spAutoFit/>
-          </a:bodyPr>
-          <a:lstStyle/>
-          <a:p>
-            <a:pPr algn="ctr"/>
-            <a:r>
-              <a:rPr lang="es-MX" sz="2400" b="1" dirty="0">
-                <a:latin typeface="Century Gothic" panose="020B0502020202020204" pitchFamily="34" charset="0"/>
-              </a:rPr>
-              <a:t>Inversa</a:t>
-            </a:r>
-            <a:endParaRPr lang="es-MX" b="1" dirty="0">
-              <a:latin typeface="Century Gothic" panose="020B0502020202020204" pitchFamily="34" charset="0"/>
-            </a:endParaRPr>
-          </a:p>
-        </p:txBody>
-      </p:sp>
       <p:cxnSp>
         <p:nvCxnSpPr>
-          <p:cNvPr id="165" name="Conector recto 164">
-            <a:extLst>
-              <a:ext uri="{FF2B5EF4-FFF2-40B4-BE49-F238E27FC236}">
-                <a16:creationId xmlns:a16="http://schemas.microsoft.com/office/drawing/2014/main" id="{3FC76833-5A2E-49D0-AA04-C755724D0324}"/>
+          <p:cNvPr id="20" name="Conector recto 19">
+            <a:extLst>
+              <a:ext uri="{FF2B5EF4-FFF2-40B4-BE49-F238E27FC236}">
+                <a16:creationId xmlns:a16="http://schemas.microsoft.com/office/drawing/2014/main" id="{B95DA4F7-090C-4C79-8CE9-E8C809725C38}"/>
               </a:ext>
             </a:extLst>
           </p:cNvPr>
           <p:cNvCxnSpPr>
             <a:cxnSpLocks/>
-            <a:endCxn id="124" idx="1"/>
+            <a:stCxn id="12" idx="0"/>
+            <a:endCxn id="8" idx="4"/>
           </p:cNvCxnSpPr>
           <p:nvPr/>
         </p:nvCxnSpPr>
         <p:spPr>
           <a:xfrm flipV="1">
-            <a:off x="3776896" y="2054924"/>
-            <a:ext cx="1468275" cy="1801948"/>
+            <a:off x="5997521" y="2822260"/>
+            <a:ext cx="6988" cy="974377"/>
           </a:xfrm>
           <a:prstGeom prst="line">
             <a:avLst/>
@@ -8364,112 +9044,24 @@
       </p:cxnSp>
       <p:cxnSp>
         <p:nvCxnSpPr>
-          <p:cNvPr id="166" name="Conector recto 165">
-            <a:extLst>
-              <a:ext uri="{FF2B5EF4-FFF2-40B4-BE49-F238E27FC236}">
-                <a16:creationId xmlns:a16="http://schemas.microsoft.com/office/drawing/2014/main" id="{B9AE571A-745F-4529-A2F8-F938EF1D6D67}"/>
+          <p:cNvPr id="21" name="Conector recto 20">
+            <a:extLst>
+              <a:ext uri="{FF2B5EF4-FFF2-40B4-BE49-F238E27FC236}">
+                <a16:creationId xmlns:a16="http://schemas.microsoft.com/office/drawing/2014/main" id="{BB9FC135-4242-4212-8661-9A36823A777A}"/>
               </a:ext>
             </a:extLst>
           </p:cNvPr>
           <p:cNvCxnSpPr>
             <a:cxnSpLocks/>
-            <a:endCxn id="145" idx="0"/>
+            <a:stCxn id="8" idx="6"/>
+            <a:endCxn id="14" idx="0"/>
           </p:cNvCxnSpPr>
           <p:nvPr/>
         </p:nvCxnSpPr>
         <p:spPr>
           <a:xfrm>
-            <a:off x="5991746" y="2822260"/>
-            <a:ext cx="8149" cy="1010704"/>
-          </a:xfrm>
-          <a:prstGeom prst="line">
-            <a:avLst/>
-          </a:prstGeom>
-          <a:ln w="38100">
-            <a:solidFill>
-              <a:schemeClr val="tx1"/>
-            </a:solidFill>
-          </a:ln>
-        </p:spPr>
-        <p:style>
-          <a:lnRef idx="1">
-            <a:schemeClr val="accent1"/>
-          </a:lnRef>
-          <a:fillRef idx="0">
-            <a:schemeClr val="accent1"/>
-          </a:fillRef>
-          <a:effectRef idx="0">
-            <a:schemeClr val="accent1"/>
-          </a:effectRef>
-          <a:fontRef idx="minor">
-            <a:schemeClr val="tx1"/>
-          </a:fontRef>
-        </p:style>
-      </p:cxnSp>
-      <p:cxnSp>
-        <p:nvCxnSpPr>
-          <p:cNvPr id="168" name="Conector recto 167">
-            <a:extLst>
-              <a:ext uri="{FF2B5EF4-FFF2-40B4-BE49-F238E27FC236}">
-                <a16:creationId xmlns:a16="http://schemas.microsoft.com/office/drawing/2014/main" id="{15C0E391-75DC-46E3-829D-D30374840049}"/>
-              </a:ext>
-            </a:extLst>
-          </p:cNvPr>
-          <p:cNvCxnSpPr>
-            <a:cxnSpLocks/>
-            <a:stCxn id="150" idx="0"/>
-            <a:endCxn id="16" idx="6"/>
-          </p:cNvCxnSpPr>
-          <p:nvPr/>
-        </p:nvCxnSpPr>
-        <p:spPr>
-          <a:xfrm flipH="1" flipV="1">
             <a:off x="6782905" y="2090537"/>
-            <a:ext cx="1570691" cy="1742427"/>
-          </a:xfrm>
-          <a:prstGeom prst="line">
-            <a:avLst/>
-          </a:prstGeom>
-          <a:ln w="38100">
-            <a:solidFill>
-              <a:schemeClr val="tx1"/>
-            </a:solidFill>
-          </a:ln>
-        </p:spPr>
-        <p:style>
-          <a:lnRef idx="1">
-            <a:schemeClr val="accent1"/>
-          </a:lnRef>
-          <a:fillRef idx="0">
-            <a:schemeClr val="accent1"/>
-          </a:fillRef>
-          <a:effectRef idx="0">
-            <a:schemeClr val="accent1"/>
-          </a:effectRef>
-          <a:fontRef idx="minor">
-            <a:schemeClr val="tx1"/>
-          </a:fontRef>
-        </p:style>
-      </p:cxnSp>
-      <p:cxnSp>
-        <p:nvCxnSpPr>
-          <p:cNvPr id="169" name="Conector recto 168">
-            <a:extLst>
-              <a:ext uri="{FF2B5EF4-FFF2-40B4-BE49-F238E27FC236}">
-                <a16:creationId xmlns:a16="http://schemas.microsoft.com/office/drawing/2014/main" id="{9058E7D1-F57F-480B-87D0-80E627C26757}"/>
-              </a:ext>
-            </a:extLst>
-          </p:cNvPr>
-          <p:cNvCxnSpPr>
-            <a:cxnSpLocks/>
-            <a:endCxn id="157" idx="0"/>
-          </p:cNvCxnSpPr>
-          <p:nvPr/>
-        </p:nvCxnSpPr>
-        <p:spPr>
-          <a:xfrm>
-            <a:off x="6785207" y="2075097"/>
-            <a:ext cx="4009084" cy="1757867"/>
+            <a:ext cx="1069758" cy="1706100"/>
           </a:xfrm>
           <a:prstGeom prst="line">
             <a:avLst/>
@@ -8498,7 +9090,87 @@
     </p:spTree>
     <p:extLst>
       <p:ext uri="{BB962C8B-B14F-4D97-AF65-F5344CB8AC3E}">
-        <p14:creationId xmlns:p14="http://schemas.microsoft.com/office/powerpoint/2010/main" val="3523506875"/>
+        <p14:creationId xmlns:p14="http://schemas.microsoft.com/office/powerpoint/2010/main" val="3032486216"/>
+      </p:ext>
+    </p:extLst>
+  </p:cSld>
+  <p:clrMapOvr>
+    <a:masterClrMapping/>
+  </p:clrMapOvr>
+</p:sld>
+</file>
+
+<file path=ppt/slides/slide4.xml><?xml version="1.0" encoding="utf-8"?>
+<p:sld xmlns:a="http://schemas.openxmlformats.org/drawingml/2006/main" xmlns:r="http://schemas.openxmlformats.org/officeDocument/2006/relationships" xmlns:p="http://schemas.openxmlformats.org/presentationml/2006/main">
+  <p:cSld>
+    <p:spTree>
+      <p:nvGrpSpPr>
+        <p:cNvPr id="1" name=""/>
+        <p:cNvGrpSpPr/>
+        <p:nvPr/>
+      </p:nvGrpSpPr>
+      <p:grpSpPr>
+        <a:xfrm>
+          <a:off x="0" y="0"/>
+          <a:ext cx="0" cy="0"/>
+          <a:chOff x="0" y="0"/>
+          <a:chExt cx="0" cy="0"/>
+        </a:xfrm>
+      </p:grpSpPr>
+      <p:sp>
+        <p:nvSpPr>
+          <p:cNvPr id="2" name="Título 1">
+            <a:extLst>
+              <a:ext uri="{FF2B5EF4-FFF2-40B4-BE49-F238E27FC236}">
+                <a16:creationId xmlns:a16="http://schemas.microsoft.com/office/drawing/2014/main" id="{673A411A-4E00-4180-BB9F-53766D7B0818}"/>
+              </a:ext>
+            </a:extLst>
+          </p:cNvPr>
+          <p:cNvSpPr>
+            <a:spLocks noGrp="1"/>
+          </p:cNvSpPr>
+          <p:nvPr>
+            <p:ph type="title"/>
+          </p:nvPr>
+        </p:nvSpPr>
+        <p:spPr/>
+        <p:txBody>
+          <a:bodyPr/>
+          <a:lstStyle/>
+          <a:p>
+            <a:endParaRPr lang="es-MX"/>
+          </a:p>
+        </p:txBody>
+      </p:sp>
+      <p:sp>
+        <p:nvSpPr>
+          <p:cNvPr id="3" name="Marcador de contenido 2">
+            <a:extLst>
+              <a:ext uri="{FF2B5EF4-FFF2-40B4-BE49-F238E27FC236}">
+                <a16:creationId xmlns:a16="http://schemas.microsoft.com/office/drawing/2014/main" id="{BE9E4B7C-406D-4816-B897-127FEE3697D2}"/>
+              </a:ext>
+            </a:extLst>
+          </p:cNvPr>
+          <p:cNvSpPr>
+            <a:spLocks noGrp="1"/>
+          </p:cNvSpPr>
+          <p:nvPr>
+            <p:ph idx="1"/>
+          </p:nvPr>
+        </p:nvSpPr>
+        <p:spPr/>
+        <p:txBody>
+          <a:bodyPr/>
+          <a:lstStyle/>
+          <a:p>
+            <a:endParaRPr lang="es-MX"/>
+          </a:p>
+        </p:txBody>
+      </p:sp>
+    </p:spTree>
+    <p:extLst>
+      <p:ext uri="{BB962C8B-B14F-4D97-AF65-F5344CB8AC3E}">
+        <p14:creationId xmlns:p14="http://schemas.microsoft.com/office/powerpoint/2010/main" val="1803875636"/>
       </p:ext>
     </p:extLst>
   </p:cSld>

</xml_diff>

<commit_message>
capturas matrices procesos windows
</commit_message>
<xml_diff>
--- a/Practica4/Arbol.pptx
+++ b/Practica4/Arbol.pptx
@@ -7,8 +7,9 @@
   <p:sldIdLst>
     <p:sldId id="256" r:id="rId2"/>
     <p:sldId id="257" r:id="rId3"/>
-    <p:sldId id="258" r:id="rId4"/>
-    <p:sldId id="259" r:id="rId5"/>
+    <p:sldId id="260" r:id="rId4"/>
+    <p:sldId id="258" r:id="rId5"/>
+    <p:sldId id="259" r:id="rId6"/>
   </p:sldIdLst>
   <p:sldSz cx="12192000" cy="6858000"/>
   <p:notesSz cx="6858000" cy="9144000"/>
@@ -8446,6 +8447,1006 @@
           <p:cNvPr id="4" name="Conector recto 3">
             <a:extLst>
               <a:ext uri="{FF2B5EF4-FFF2-40B4-BE49-F238E27FC236}">
+                <a16:creationId xmlns:a16="http://schemas.microsoft.com/office/drawing/2014/main" id="{3387EB05-E8BE-437E-AB6F-640014651A0C}"/>
+              </a:ext>
+            </a:extLst>
+          </p:cNvPr>
+          <p:cNvCxnSpPr>
+            <a:cxnSpLocks/>
+          </p:cNvCxnSpPr>
+          <p:nvPr/>
+        </p:nvCxnSpPr>
+        <p:spPr>
+          <a:xfrm>
+            <a:off x="5380808" y="1009795"/>
+            <a:ext cx="1288864" cy="0"/>
+          </a:xfrm>
+          <a:prstGeom prst="line">
+            <a:avLst/>
+          </a:prstGeom>
+          <a:ln w="76200">
+            <a:solidFill>
+              <a:schemeClr val="tx1"/>
+            </a:solidFill>
+          </a:ln>
+        </p:spPr>
+        <p:style>
+          <a:lnRef idx="1">
+            <a:schemeClr val="accent1"/>
+          </a:lnRef>
+          <a:fillRef idx="0">
+            <a:schemeClr val="accent1"/>
+          </a:fillRef>
+          <a:effectRef idx="0">
+            <a:schemeClr val="accent1"/>
+          </a:effectRef>
+          <a:fontRef idx="minor">
+            <a:schemeClr val="tx1"/>
+          </a:fontRef>
+        </p:style>
+      </p:cxnSp>
+      <p:sp>
+        <p:nvSpPr>
+          <p:cNvPr id="5" name="CuadroTexto 4">
+            <a:extLst>
+              <a:ext uri="{FF2B5EF4-FFF2-40B4-BE49-F238E27FC236}">
+                <a16:creationId xmlns:a16="http://schemas.microsoft.com/office/drawing/2014/main" id="{F06CB666-7864-4A34-BB5C-A5EC76272026}"/>
+              </a:ext>
+            </a:extLst>
+          </p:cNvPr>
+          <p:cNvSpPr txBox="1"/>
+          <p:nvPr/>
+        </p:nvSpPr>
+        <p:spPr>
+          <a:xfrm>
+            <a:off x="4769913" y="389322"/>
+            <a:ext cx="2489314" cy="523220"/>
+          </a:xfrm>
+          <a:prstGeom prst="rect">
+            <a:avLst/>
+          </a:prstGeom>
+          <a:noFill/>
+        </p:spPr>
+        <p:txBody>
+          <a:bodyPr wrap="square" rtlCol="0">
+            <a:spAutoFit/>
+          </a:bodyPr>
+          <a:lstStyle/>
+          <a:p>
+            <a:pPr algn="ctr"/>
+            <a:r>
+              <a:rPr lang="es-MX" sz="2800" b="1" dirty="0">
+                <a:latin typeface="Century Gothic" panose="020B0502020202020204" pitchFamily="34" charset="0"/>
+              </a:rPr>
+              <a:t>main</a:t>
+            </a:r>
+            <a:endParaRPr lang="es-MX" b="1" dirty="0">
+              <a:latin typeface="Century Gothic" panose="020B0502020202020204" pitchFamily="34" charset="0"/>
+            </a:endParaRPr>
+          </a:p>
+        </p:txBody>
+      </p:sp>
+      <p:cxnSp>
+        <p:nvCxnSpPr>
+          <p:cNvPr id="6" name="Conector recto 5">
+            <a:extLst>
+              <a:ext uri="{FF2B5EF4-FFF2-40B4-BE49-F238E27FC236}">
+                <a16:creationId xmlns:a16="http://schemas.microsoft.com/office/drawing/2014/main" id="{1FE15B38-574C-434B-A3AA-F2B61F0D5180}"/>
+              </a:ext>
+            </a:extLst>
+          </p:cNvPr>
+          <p:cNvCxnSpPr>
+            <a:cxnSpLocks/>
+          </p:cNvCxnSpPr>
+          <p:nvPr/>
+        </p:nvCxnSpPr>
+        <p:spPr>
+          <a:xfrm>
+            <a:off x="5999895" y="1009795"/>
+            <a:ext cx="0" cy="367734"/>
+          </a:xfrm>
+          <a:prstGeom prst="line">
+            <a:avLst/>
+          </a:prstGeom>
+          <a:ln w="76200">
+            <a:solidFill>
+              <a:schemeClr val="tx1"/>
+            </a:solidFill>
+          </a:ln>
+        </p:spPr>
+        <p:style>
+          <a:lnRef idx="1">
+            <a:schemeClr val="accent1"/>
+          </a:lnRef>
+          <a:fillRef idx="0">
+            <a:schemeClr val="accent1"/>
+          </a:fillRef>
+          <a:effectRef idx="0">
+            <a:schemeClr val="accent1"/>
+          </a:effectRef>
+          <a:fontRef idx="minor">
+            <a:schemeClr val="tx1"/>
+          </a:fontRef>
+        </p:style>
+      </p:cxnSp>
+      <p:sp>
+        <p:nvSpPr>
+          <p:cNvPr id="7" name="Elipse 6">
+            <a:extLst>
+              <a:ext uri="{FF2B5EF4-FFF2-40B4-BE49-F238E27FC236}">
+                <a16:creationId xmlns:a16="http://schemas.microsoft.com/office/drawing/2014/main" id="{F95EE549-1F0C-4524-A662-57DBEF994CB9}"/>
+              </a:ext>
+            </a:extLst>
+          </p:cNvPr>
+          <p:cNvSpPr/>
+          <p:nvPr/>
+        </p:nvSpPr>
+        <p:spPr>
+          <a:xfrm>
+            <a:off x="510005" y="3862468"/>
+            <a:ext cx="1368657" cy="1338320"/>
+          </a:xfrm>
+          <a:prstGeom prst="ellipse">
+            <a:avLst/>
+          </a:prstGeom>
+          <a:solidFill>
+            <a:srgbClr val="DE7EA9"/>
+          </a:solidFill>
+          <a:ln>
+            <a:solidFill>
+              <a:srgbClr val="D8669A"/>
+            </a:solidFill>
+          </a:ln>
+        </p:spPr>
+        <p:style>
+          <a:lnRef idx="2">
+            <a:schemeClr val="accent1">
+              <a:shade val="50000"/>
+            </a:schemeClr>
+          </a:lnRef>
+          <a:fillRef idx="1">
+            <a:schemeClr val="accent1"/>
+          </a:fillRef>
+          <a:effectRef idx="0">
+            <a:schemeClr val="accent1"/>
+          </a:effectRef>
+          <a:fontRef idx="minor">
+            <a:schemeClr val="lt1"/>
+          </a:fontRef>
+        </p:style>
+        <p:txBody>
+          <a:bodyPr rtlCol="0" anchor="ctr"/>
+          <a:lstStyle/>
+          <a:p>
+            <a:pPr algn="ctr"/>
+            <a:endParaRPr lang="es-MX"/>
+          </a:p>
+        </p:txBody>
+      </p:sp>
+      <p:cxnSp>
+        <p:nvCxnSpPr>
+          <p:cNvPr id="8" name="Conector recto 7">
+            <a:extLst>
+              <a:ext uri="{FF2B5EF4-FFF2-40B4-BE49-F238E27FC236}">
+                <a16:creationId xmlns:a16="http://schemas.microsoft.com/office/drawing/2014/main" id="{07BD1620-B34C-42FE-8F6C-82E05B1E2F5F}"/>
+              </a:ext>
+            </a:extLst>
+          </p:cNvPr>
+          <p:cNvCxnSpPr>
+            <a:cxnSpLocks/>
+          </p:cNvCxnSpPr>
+          <p:nvPr/>
+        </p:nvCxnSpPr>
+        <p:spPr>
+          <a:xfrm flipV="1">
+            <a:off x="1536826" y="1377529"/>
+            <a:ext cx="4454920" cy="2594555"/>
+          </a:xfrm>
+          <a:prstGeom prst="line">
+            <a:avLst/>
+          </a:prstGeom>
+          <a:ln w="38100">
+            <a:solidFill>
+              <a:schemeClr val="tx1"/>
+            </a:solidFill>
+          </a:ln>
+        </p:spPr>
+        <p:style>
+          <a:lnRef idx="1">
+            <a:schemeClr val="accent1"/>
+          </a:lnRef>
+          <a:fillRef idx="0">
+            <a:schemeClr val="accent1"/>
+          </a:fillRef>
+          <a:effectRef idx="0">
+            <a:schemeClr val="accent1"/>
+          </a:effectRef>
+          <a:fontRef idx="minor">
+            <a:schemeClr val="tx1"/>
+          </a:fontRef>
+        </p:style>
+      </p:cxnSp>
+      <p:sp>
+        <p:nvSpPr>
+          <p:cNvPr id="9" name="CuadroTexto 8">
+            <a:extLst>
+              <a:ext uri="{FF2B5EF4-FFF2-40B4-BE49-F238E27FC236}">
+                <a16:creationId xmlns:a16="http://schemas.microsoft.com/office/drawing/2014/main" id="{A9C2104A-27F8-4C41-A82B-A931C89B5ECE}"/>
+              </a:ext>
+            </a:extLst>
+          </p:cNvPr>
+          <p:cNvSpPr txBox="1"/>
+          <p:nvPr/>
+        </p:nvSpPr>
+        <p:spPr>
+          <a:xfrm>
+            <a:off x="447758" y="4300795"/>
+            <a:ext cx="1493150" cy="461665"/>
+          </a:xfrm>
+          <a:prstGeom prst="rect">
+            <a:avLst/>
+          </a:prstGeom>
+          <a:noFill/>
+        </p:spPr>
+        <p:txBody>
+          <a:bodyPr wrap="square" rtlCol="0">
+            <a:spAutoFit/>
+          </a:bodyPr>
+          <a:lstStyle/>
+          <a:p>
+            <a:pPr algn="ctr"/>
+            <a:r>
+              <a:rPr lang="es-MX" sz="2400" b="1" dirty="0">
+                <a:latin typeface="Century Gothic" panose="020B0502020202020204" pitchFamily="34" charset="0"/>
+              </a:rPr>
+              <a:t>Sumar</a:t>
+            </a:r>
+            <a:endParaRPr lang="es-MX" b="1" dirty="0">
+              <a:latin typeface="Century Gothic" panose="020B0502020202020204" pitchFamily="34" charset="0"/>
+            </a:endParaRPr>
+          </a:p>
+        </p:txBody>
+      </p:sp>
+      <p:sp>
+        <p:nvSpPr>
+          <p:cNvPr id="10" name="Elipse 9">
+            <a:extLst>
+              <a:ext uri="{FF2B5EF4-FFF2-40B4-BE49-F238E27FC236}">
+                <a16:creationId xmlns:a16="http://schemas.microsoft.com/office/drawing/2014/main" id="{227777E1-7FB8-4248-B1DB-96527EA144A6}"/>
+              </a:ext>
+            </a:extLst>
+          </p:cNvPr>
+          <p:cNvSpPr/>
+          <p:nvPr/>
+        </p:nvSpPr>
+        <p:spPr>
+          <a:xfrm>
+            <a:off x="2899619" y="3832964"/>
+            <a:ext cx="1368657" cy="1338320"/>
+          </a:xfrm>
+          <a:prstGeom prst="ellipse">
+            <a:avLst/>
+          </a:prstGeom>
+          <a:solidFill>
+            <a:srgbClr val="DE7EA9"/>
+          </a:solidFill>
+          <a:ln>
+            <a:solidFill>
+              <a:srgbClr val="D8669A"/>
+            </a:solidFill>
+          </a:ln>
+        </p:spPr>
+        <p:style>
+          <a:lnRef idx="2">
+            <a:schemeClr val="accent1">
+              <a:shade val="50000"/>
+            </a:schemeClr>
+          </a:lnRef>
+          <a:fillRef idx="1">
+            <a:schemeClr val="accent1"/>
+          </a:fillRef>
+          <a:effectRef idx="0">
+            <a:schemeClr val="accent1"/>
+          </a:effectRef>
+          <a:fontRef idx="minor">
+            <a:schemeClr val="lt1"/>
+          </a:fontRef>
+        </p:style>
+        <p:txBody>
+          <a:bodyPr rtlCol="0" anchor="ctr"/>
+          <a:lstStyle/>
+          <a:p>
+            <a:pPr algn="ctr"/>
+            <a:endParaRPr lang="es-MX"/>
+          </a:p>
+        </p:txBody>
+      </p:sp>
+      <p:sp>
+        <p:nvSpPr>
+          <p:cNvPr id="11" name="CuadroTexto 10">
+            <a:extLst>
+              <a:ext uri="{FF2B5EF4-FFF2-40B4-BE49-F238E27FC236}">
+                <a16:creationId xmlns:a16="http://schemas.microsoft.com/office/drawing/2014/main" id="{5FAD1FE9-DEAE-486E-894E-6B6FC6C465C0}"/>
+              </a:ext>
+            </a:extLst>
+          </p:cNvPr>
+          <p:cNvSpPr txBox="1"/>
+          <p:nvPr/>
+        </p:nvSpPr>
+        <p:spPr>
+          <a:xfrm>
+            <a:off x="2837372" y="4271291"/>
+            <a:ext cx="1493150" cy="461665"/>
+          </a:xfrm>
+          <a:prstGeom prst="rect">
+            <a:avLst/>
+          </a:prstGeom>
+          <a:noFill/>
+        </p:spPr>
+        <p:txBody>
+          <a:bodyPr wrap="square" rtlCol="0">
+            <a:spAutoFit/>
+          </a:bodyPr>
+          <a:lstStyle/>
+          <a:p>
+            <a:pPr algn="ctr"/>
+            <a:r>
+              <a:rPr lang="es-MX" sz="2400" b="1" dirty="0">
+                <a:latin typeface="Century Gothic" panose="020B0502020202020204" pitchFamily="34" charset="0"/>
+              </a:rPr>
+              <a:t>Restar</a:t>
+            </a:r>
+            <a:endParaRPr lang="es-MX" b="1" dirty="0">
+              <a:latin typeface="Century Gothic" panose="020B0502020202020204" pitchFamily="34" charset="0"/>
+            </a:endParaRPr>
+          </a:p>
+        </p:txBody>
+      </p:sp>
+      <p:sp>
+        <p:nvSpPr>
+          <p:cNvPr id="12" name="Elipse 11">
+            <a:extLst>
+              <a:ext uri="{FF2B5EF4-FFF2-40B4-BE49-F238E27FC236}">
+                <a16:creationId xmlns:a16="http://schemas.microsoft.com/office/drawing/2014/main" id="{6C8A255D-3809-415C-9215-FAADD8E236D0}"/>
+              </a:ext>
+            </a:extLst>
+          </p:cNvPr>
+          <p:cNvSpPr/>
+          <p:nvPr/>
+        </p:nvSpPr>
+        <p:spPr>
+          <a:xfrm>
+            <a:off x="4718231" y="3832964"/>
+            <a:ext cx="1368657" cy="1338320"/>
+          </a:xfrm>
+          <a:prstGeom prst="ellipse">
+            <a:avLst/>
+          </a:prstGeom>
+          <a:solidFill>
+            <a:srgbClr val="DE7EA9"/>
+          </a:solidFill>
+          <a:ln>
+            <a:solidFill>
+              <a:srgbClr val="D8669A"/>
+            </a:solidFill>
+          </a:ln>
+        </p:spPr>
+        <p:style>
+          <a:lnRef idx="2">
+            <a:schemeClr val="accent1">
+              <a:shade val="50000"/>
+            </a:schemeClr>
+          </a:lnRef>
+          <a:fillRef idx="1">
+            <a:schemeClr val="accent1"/>
+          </a:fillRef>
+          <a:effectRef idx="0">
+            <a:schemeClr val="accent1"/>
+          </a:effectRef>
+          <a:fontRef idx="minor">
+            <a:schemeClr val="lt1"/>
+          </a:fontRef>
+        </p:style>
+        <p:txBody>
+          <a:bodyPr rtlCol="0" anchor="ctr"/>
+          <a:lstStyle/>
+          <a:p>
+            <a:pPr algn="ctr"/>
+            <a:endParaRPr lang="es-MX"/>
+          </a:p>
+        </p:txBody>
+      </p:sp>
+      <p:sp>
+        <p:nvSpPr>
+          <p:cNvPr id="13" name="CuadroTexto 12">
+            <a:extLst>
+              <a:ext uri="{FF2B5EF4-FFF2-40B4-BE49-F238E27FC236}">
+                <a16:creationId xmlns:a16="http://schemas.microsoft.com/office/drawing/2014/main" id="{D91F888A-5F43-4AC0-B9E8-A3888DC2290C}"/>
+              </a:ext>
+            </a:extLst>
+          </p:cNvPr>
+          <p:cNvSpPr txBox="1"/>
+          <p:nvPr/>
+        </p:nvSpPr>
+        <p:spPr>
+          <a:xfrm>
+            <a:off x="4655985" y="4300795"/>
+            <a:ext cx="1493150" cy="400110"/>
+          </a:xfrm>
+          <a:prstGeom prst="rect">
+            <a:avLst/>
+          </a:prstGeom>
+          <a:noFill/>
+        </p:spPr>
+        <p:txBody>
+          <a:bodyPr wrap="square" rtlCol="0">
+            <a:spAutoFit/>
+          </a:bodyPr>
+          <a:lstStyle/>
+          <a:p>
+            <a:pPr algn="ctr"/>
+            <a:r>
+              <a:rPr lang="es-MX" sz="2000" b="1" dirty="0">
+                <a:latin typeface="Century Gothic" panose="020B0502020202020204" pitchFamily="34" charset="0"/>
+              </a:rPr>
+              <a:t>Multiplicar</a:t>
+            </a:r>
+            <a:endParaRPr lang="es-MX" sz="1600" b="1" dirty="0">
+              <a:latin typeface="Century Gothic" panose="020B0502020202020204" pitchFamily="34" charset="0"/>
+            </a:endParaRPr>
+          </a:p>
+        </p:txBody>
+      </p:sp>
+      <p:sp>
+        <p:nvSpPr>
+          <p:cNvPr id="14" name="Elipse 13">
+            <a:extLst>
+              <a:ext uri="{FF2B5EF4-FFF2-40B4-BE49-F238E27FC236}">
+                <a16:creationId xmlns:a16="http://schemas.microsoft.com/office/drawing/2014/main" id="{D50BFF65-B0A1-4821-B126-F6B80FD42BE9}"/>
+              </a:ext>
+            </a:extLst>
+          </p:cNvPr>
+          <p:cNvSpPr/>
+          <p:nvPr/>
+        </p:nvSpPr>
+        <p:spPr>
+          <a:xfrm>
+            <a:off x="7006176" y="3832964"/>
+            <a:ext cx="1368657" cy="1338320"/>
+          </a:xfrm>
+          <a:prstGeom prst="ellipse">
+            <a:avLst/>
+          </a:prstGeom>
+          <a:solidFill>
+            <a:srgbClr val="DE7EA9"/>
+          </a:solidFill>
+          <a:ln>
+            <a:solidFill>
+              <a:srgbClr val="D8669A"/>
+            </a:solidFill>
+          </a:ln>
+        </p:spPr>
+        <p:style>
+          <a:lnRef idx="2">
+            <a:schemeClr val="accent1">
+              <a:shade val="50000"/>
+            </a:schemeClr>
+          </a:lnRef>
+          <a:fillRef idx="1">
+            <a:schemeClr val="accent1"/>
+          </a:fillRef>
+          <a:effectRef idx="0">
+            <a:schemeClr val="accent1"/>
+          </a:effectRef>
+          <a:fontRef idx="minor">
+            <a:schemeClr val="lt1"/>
+          </a:fontRef>
+        </p:style>
+        <p:txBody>
+          <a:bodyPr rtlCol="0" anchor="ctr"/>
+          <a:lstStyle/>
+          <a:p>
+            <a:pPr algn="ctr"/>
+            <a:endParaRPr lang="es-MX"/>
+          </a:p>
+        </p:txBody>
+      </p:sp>
+      <p:sp>
+        <p:nvSpPr>
+          <p:cNvPr id="15" name="CuadroTexto 14">
+            <a:extLst>
+              <a:ext uri="{FF2B5EF4-FFF2-40B4-BE49-F238E27FC236}">
+                <a16:creationId xmlns:a16="http://schemas.microsoft.com/office/drawing/2014/main" id="{1D00E818-09B6-4719-A7CE-ED8F67FC78CE}"/>
+              </a:ext>
+            </a:extLst>
+          </p:cNvPr>
+          <p:cNvSpPr txBox="1"/>
+          <p:nvPr/>
+        </p:nvSpPr>
+        <p:spPr>
+          <a:xfrm>
+            <a:off x="6943929" y="4271291"/>
+            <a:ext cx="1493150" cy="369332"/>
+          </a:xfrm>
+          <a:prstGeom prst="rect">
+            <a:avLst/>
+          </a:prstGeom>
+          <a:noFill/>
+        </p:spPr>
+        <p:txBody>
+          <a:bodyPr wrap="square" rtlCol="0">
+            <a:spAutoFit/>
+          </a:bodyPr>
+          <a:lstStyle/>
+          <a:p>
+            <a:pPr algn="ctr"/>
+            <a:r>
+              <a:rPr lang="es-MX" b="1" dirty="0">
+                <a:latin typeface="Century Gothic" panose="020B0502020202020204" pitchFamily="34" charset="0"/>
+              </a:rPr>
+              <a:t>Transpuesta</a:t>
+            </a:r>
+            <a:endParaRPr lang="es-MX" sz="1400" b="1" dirty="0">
+              <a:latin typeface="Century Gothic" panose="020B0502020202020204" pitchFamily="34" charset="0"/>
+            </a:endParaRPr>
+          </a:p>
+        </p:txBody>
+      </p:sp>
+      <p:sp>
+        <p:nvSpPr>
+          <p:cNvPr id="16" name="Elipse 15">
+            <a:extLst>
+              <a:ext uri="{FF2B5EF4-FFF2-40B4-BE49-F238E27FC236}">
+                <a16:creationId xmlns:a16="http://schemas.microsoft.com/office/drawing/2014/main" id="{05C82844-20C2-417B-B2AA-D3040E8B368F}"/>
+              </a:ext>
+            </a:extLst>
+          </p:cNvPr>
+          <p:cNvSpPr/>
+          <p:nvPr/>
+        </p:nvSpPr>
+        <p:spPr>
+          <a:xfrm>
+            <a:off x="8894033" y="3764438"/>
+            <a:ext cx="1368657" cy="1338320"/>
+          </a:xfrm>
+          <a:prstGeom prst="ellipse">
+            <a:avLst/>
+          </a:prstGeom>
+          <a:solidFill>
+            <a:srgbClr val="DE7EA9"/>
+          </a:solidFill>
+          <a:ln>
+            <a:solidFill>
+              <a:srgbClr val="D8669A"/>
+            </a:solidFill>
+          </a:ln>
+        </p:spPr>
+        <p:style>
+          <a:lnRef idx="2">
+            <a:schemeClr val="accent1">
+              <a:shade val="50000"/>
+            </a:schemeClr>
+          </a:lnRef>
+          <a:fillRef idx="1">
+            <a:schemeClr val="accent1"/>
+          </a:fillRef>
+          <a:effectRef idx="0">
+            <a:schemeClr val="accent1"/>
+          </a:effectRef>
+          <a:fontRef idx="minor">
+            <a:schemeClr val="lt1"/>
+          </a:fontRef>
+        </p:style>
+        <p:txBody>
+          <a:bodyPr rtlCol="0" anchor="ctr"/>
+          <a:lstStyle/>
+          <a:p>
+            <a:pPr algn="ctr"/>
+            <a:endParaRPr lang="es-MX"/>
+          </a:p>
+        </p:txBody>
+      </p:sp>
+      <p:sp>
+        <p:nvSpPr>
+          <p:cNvPr id="17" name="CuadroTexto 16">
+            <a:extLst>
+              <a:ext uri="{FF2B5EF4-FFF2-40B4-BE49-F238E27FC236}">
+                <a16:creationId xmlns:a16="http://schemas.microsoft.com/office/drawing/2014/main" id="{8CEB9493-D408-4B86-A7E4-15BF10842760}"/>
+              </a:ext>
+            </a:extLst>
+          </p:cNvPr>
+          <p:cNvSpPr txBox="1"/>
+          <p:nvPr/>
+        </p:nvSpPr>
+        <p:spPr>
+          <a:xfrm>
+            <a:off x="8894033" y="4227918"/>
+            <a:ext cx="1493150" cy="461665"/>
+          </a:xfrm>
+          <a:prstGeom prst="rect">
+            <a:avLst/>
+          </a:prstGeom>
+          <a:noFill/>
+        </p:spPr>
+        <p:txBody>
+          <a:bodyPr wrap="square" rtlCol="0">
+            <a:spAutoFit/>
+          </a:bodyPr>
+          <a:lstStyle/>
+          <a:p>
+            <a:pPr algn="ctr"/>
+            <a:r>
+              <a:rPr lang="es-MX" sz="2400" b="1" dirty="0">
+                <a:latin typeface="Century Gothic" panose="020B0502020202020204" pitchFamily="34" charset="0"/>
+              </a:rPr>
+              <a:t>Inversa</a:t>
+            </a:r>
+            <a:endParaRPr lang="es-MX" b="1" dirty="0">
+              <a:latin typeface="Century Gothic" panose="020B0502020202020204" pitchFamily="34" charset="0"/>
+            </a:endParaRPr>
+          </a:p>
+        </p:txBody>
+      </p:sp>
+      <p:cxnSp>
+        <p:nvCxnSpPr>
+          <p:cNvPr id="18" name="Conector recto 17">
+            <a:extLst>
+              <a:ext uri="{FF2B5EF4-FFF2-40B4-BE49-F238E27FC236}">
+                <a16:creationId xmlns:a16="http://schemas.microsoft.com/office/drawing/2014/main" id="{CE3736E3-314F-44E2-913A-9CB62B9092C2}"/>
+              </a:ext>
+            </a:extLst>
+          </p:cNvPr>
+          <p:cNvCxnSpPr>
+            <a:cxnSpLocks/>
+          </p:cNvCxnSpPr>
+          <p:nvPr/>
+        </p:nvCxnSpPr>
+        <p:spPr>
+          <a:xfrm flipV="1">
+            <a:off x="3776896" y="1306182"/>
+            <a:ext cx="2240748" cy="2550690"/>
+          </a:xfrm>
+          <a:prstGeom prst="line">
+            <a:avLst/>
+          </a:prstGeom>
+          <a:ln w="38100">
+            <a:solidFill>
+              <a:schemeClr val="tx1"/>
+            </a:solidFill>
+          </a:ln>
+        </p:spPr>
+        <p:style>
+          <a:lnRef idx="1">
+            <a:schemeClr val="accent1"/>
+          </a:lnRef>
+          <a:fillRef idx="0">
+            <a:schemeClr val="accent1"/>
+          </a:fillRef>
+          <a:effectRef idx="0">
+            <a:schemeClr val="accent1"/>
+          </a:effectRef>
+          <a:fontRef idx="minor">
+            <a:schemeClr val="tx1"/>
+          </a:fontRef>
+        </p:style>
+      </p:cxnSp>
+      <p:cxnSp>
+        <p:nvCxnSpPr>
+          <p:cNvPr id="19" name="Conector recto 18">
+            <a:extLst>
+              <a:ext uri="{FF2B5EF4-FFF2-40B4-BE49-F238E27FC236}">
+                <a16:creationId xmlns:a16="http://schemas.microsoft.com/office/drawing/2014/main" id="{7C9091D9-EE9A-4B77-B480-B1E06A9DFCAD}"/>
+              </a:ext>
+            </a:extLst>
+          </p:cNvPr>
+          <p:cNvCxnSpPr>
+            <a:cxnSpLocks/>
+            <a:endCxn id="12" idx="0"/>
+          </p:cNvCxnSpPr>
+          <p:nvPr/>
+        </p:nvCxnSpPr>
+        <p:spPr>
+          <a:xfrm flipH="1">
+            <a:off x="5402560" y="1338507"/>
+            <a:ext cx="597335" cy="2494457"/>
+          </a:xfrm>
+          <a:prstGeom prst="line">
+            <a:avLst/>
+          </a:prstGeom>
+          <a:ln w="38100">
+            <a:solidFill>
+              <a:schemeClr val="tx1"/>
+            </a:solidFill>
+          </a:ln>
+        </p:spPr>
+        <p:style>
+          <a:lnRef idx="1">
+            <a:schemeClr val="accent1"/>
+          </a:lnRef>
+          <a:fillRef idx="0">
+            <a:schemeClr val="accent1"/>
+          </a:fillRef>
+          <a:effectRef idx="0">
+            <a:schemeClr val="accent1"/>
+          </a:effectRef>
+          <a:fontRef idx="minor">
+            <a:schemeClr val="tx1"/>
+          </a:fontRef>
+        </p:style>
+      </p:cxnSp>
+      <p:cxnSp>
+        <p:nvCxnSpPr>
+          <p:cNvPr id="20" name="Conector recto 19">
+            <a:extLst>
+              <a:ext uri="{FF2B5EF4-FFF2-40B4-BE49-F238E27FC236}">
+                <a16:creationId xmlns:a16="http://schemas.microsoft.com/office/drawing/2014/main" id="{C43FAC58-F330-4CBF-9872-4B7CCDB42D43}"/>
+              </a:ext>
+            </a:extLst>
+          </p:cNvPr>
+          <p:cNvCxnSpPr>
+            <a:cxnSpLocks/>
+            <a:stCxn id="14" idx="0"/>
+          </p:cNvCxnSpPr>
+          <p:nvPr/>
+        </p:nvCxnSpPr>
+        <p:spPr>
+          <a:xfrm flipH="1" flipV="1">
+            <a:off x="5999895" y="1403436"/>
+            <a:ext cx="1690610" cy="2429528"/>
+          </a:xfrm>
+          <a:prstGeom prst="line">
+            <a:avLst/>
+          </a:prstGeom>
+          <a:ln w="38100">
+            <a:solidFill>
+              <a:schemeClr val="tx1"/>
+            </a:solidFill>
+          </a:ln>
+        </p:spPr>
+        <p:style>
+          <a:lnRef idx="1">
+            <a:schemeClr val="accent1"/>
+          </a:lnRef>
+          <a:fillRef idx="0">
+            <a:schemeClr val="accent1"/>
+          </a:fillRef>
+          <a:effectRef idx="0">
+            <a:schemeClr val="accent1"/>
+          </a:effectRef>
+          <a:fontRef idx="minor">
+            <a:schemeClr val="tx1"/>
+          </a:fontRef>
+        </p:style>
+      </p:cxnSp>
+      <p:cxnSp>
+        <p:nvCxnSpPr>
+          <p:cNvPr id="21" name="Conector recto 20">
+            <a:extLst>
+              <a:ext uri="{FF2B5EF4-FFF2-40B4-BE49-F238E27FC236}">
+                <a16:creationId xmlns:a16="http://schemas.microsoft.com/office/drawing/2014/main" id="{7C16642D-505A-4D7E-912D-79499C55ED1A}"/>
+              </a:ext>
+            </a:extLst>
+          </p:cNvPr>
+          <p:cNvCxnSpPr>
+            <a:cxnSpLocks/>
+            <a:endCxn id="16" idx="0"/>
+          </p:cNvCxnSpPr>
+          <p:nvPr/>
+        </p:nvCxnSpPr>
+        <p:spPr>
+          <a:xfrm>
+            <a:off x="5999895" y="1350869"/>
+            <a:ext cx="3578467" cy="2413569"/>
+          </a:xfrm>
+          <a:prstGeom prst="line">
+            <a:avLst/>
+          </a:prstGeom>
+          <a:ln w="38100">
+            <a:solidFill>
+              <a:schemeClr val="tx1"/>
+            </a:solidFill>
+          </a:ln>
+        </p:spPr>
+        <p:style>
+          <a:lnRef idx="1">
+            <a:schemeClr val="accent1"/>
+          </a:lnRef>
+          <a:fillRef idx="0">
+            <a:schemeClr val="accent1"/>
+          </a:fillRef>
+          <a:effectRef idx="0">
+            <a:schemeClr val="accent1"/>
+          </a:effectRef>
+          <a:fontRef idx="minor">
+            <a:schemeClr val="tx1"/>
+          </a:fontRef>
+        </p:style>
+      </p:cxnSp>
+      <p:sp>
+        <p:nvSpPr>
+          <p:cNvPr id="26" name="Elipse 25">
+            <a:extLst>
+              <a:ext uri="{FF2B5EF4-FFF2-40B4-BE49-F238E27FC236}">
+                <a16:creationId xmlns:a16="http://schemas.microsoft.com/office/drawing/2014/main" id="{80FDF3AF-A09D-48C5-80DD-DBCC2AB09828}"/>
+              </a:ext>
+            </a:extLst>
+          </p:cNvPr>
+          <p:cNvSpPr/>
+          <p:nvPr/>
+        </p:nvSpPr>
+        <p:spPr>
+          <a:xfrm>
+            <a:off x="10655174" y="3764438"/>
+            <a:ext cx="1368657" cy="1338320"/>
+          </a:xfrm>
+          <a:prstGeom prst="ellipse">
+            <a:avLst/>
+          </a:prstGeom>
+          <a:solidFill>
+            <a:srgbClr val="DE7EA9"/>
+          </a:solidFill>
+          <a:ln>
+            <a:solidFill>
+              <a:srgbClr val="D8669A"/>
+            </a:solidFill>
+          </a:ln>
+        </p:spPr>
+        <p:style>
+          <a:lnRef idx="2">
+            <a:schemeClr val="accent1">
+              <a:shade val="50000"/>
+            </a:schemeClr>
+          </a:lnRef>
+          <a:fillRef idx="1">
+            <a:schemeClr val="accent1"/>
+          </a:fillRef>
+          <a:effectRef idx="0">
+            <a:schemeClr val="accent1"/>
+          </a:effectRef>
+          <a:fontRef idx="minor">
+            <a:schemeClr val="lt1"/>
+          </a:fontRef>
+        </p:style>
+        <p:txBody>
+          <a:bodyPr rtlCol="0" anchor="ctr"/>
+          <a:lstStyle/>
+          <a:p>
+            <a:pPr algn="ctr"/>
+            <a:endParaRPr lang="es-MX"/>
+          </a:p>
+        </p:txBody>
+      </p:sp>
+      <p:sp>
+        <p:nvSpPr>
+          <p:cNvPr id="27" name="CuadroTexto 26">
+            <a:extLst>
+              <a:ext uri="{FF2B5EF4-FFF2-40B4-BE49-F238E27FC236}">
+                <a16:creationId xmlns:a16="http://schemas.microsoft.com/office/drawing/2014/main" id="{6860789B-C46D-44F9-A774-E459DFF2E3FA}"/>
+              </a:ext>
+            </a:extLst>
+          </p:cNvPr>
+          <p:cNvSpPr txBox="1"/>
+          <p:nvPr/>
+        </p:nvSpPr>
+        <p:spPr>
+          <a:xfrm>
+            <a:off x="10592927" y="3999063"/>
+            <a:ext cx="1493150" cy="707886"/>
+          </a:xfrm>
+          <a:prstGeom prst="rect">
+            <a:avLst/>
+          </a:prstGeom>
+          <a:noFill/>
+        </p:spPr>
+        <p:txBody>
+          <a:bodyPr wrap="square" rtlCol="0">
+            <a:spAutoFit/>
+          </a:bodyPr>
+          <a:lstStyle/>
+          <a:p>
+            <a:pPr algn="ctr"/>
+            <a:r>
+              <a:rPr lang="es-MX" sz="2000" b="1" dirty="0">
+                <a:latin typeface="Century Gothic" panose="020B0502020202020204" pitchFamily="34" charset="0"/>
+              </a:rPr>
+              <a:t>Leer</a:t>
+            </a:r>
+            <a:br>
+              <a:rPr lang="es-MX" sz="2000" b="1" dirty="0">
+                <a:latin typeface="Century Gothic" panose="020B0502020202020204" pitchFamily="34" charset="0"/>
+              </a:rPr>
+            </a:br>
+            <a:r>
+              <a:rPr lang="es-MX" sz="2000" b="1" dirty="0">
+                <a:latin typeface="Century Gothic" panose="020B0502020202020204" pitchFamily="34" charset="0"/>
+              </a:rPr>
+              <a:t>archivos</a:t>
+            </a:r>
+            <a:endParaRPr lang="es-MX" sz="1600" b="1" dirty="0">
+              <a:latin typeface="Century Gothic" panose="020B0502020202020204" pitchFamily="34" charset="0"/>
+            </a:endParaRPr>
+          </a:p>
+        </p:txBody>
+      </p:sp>
+      <p:cxnSp>
+        <p:nvCxnSpPr>
+          <p:cNvPr id="28" name="Conector recto 27">
+            <a:extLst>
+              <a:ext uri="{FF2B5EF4-FFF2-40B4-BE49-F238E27FC236}">
+                <a16:creationId xmlns:a16="http://schemas.microsoft.com/office/drawing/2014/main" id="{139B6EC3-CA6F-4DE0-91A6-667C68A0EF6B}"/>
+              </a:ext>
+            </a:extLst>
+          </p:cNvPr>
+          <p:cNvCxnSpPr>
+            <a:cxnSpLocks/>
+            <a:endCxn id="26" idx="0"/>
+          </p:cNvCxnSpPr>
+          <p:nvPr/>
+        </p:nvCxnSpPr>
+        <p:spPr>
+          <a:xfrm>
+            <a:off x="5999894" y="1376022"/>
+            <a:ext cx="5339609" cy="2388416"/>
+          </a:xfrm>
+          <a:prstGeom prst="line">
+            <a:avLst/>
+          </a:prstGeom>
+          <a:ln w="38100">
+            <a:solidFill>
+              <a:schemeClr val="tx1"/>
+            </a:solidFill>
+          </a:ln>
+        </p:spPr>
+        <p:style>
+          <a:lnRef idx="1">
+            <a:schemeClr val="accent1"/>
+          </a:lnRef>
+          <a:fillRef idx="0">
+            <a:schemeClr val="accent1"/>
+          </a:fillRef>
+          <a:effectRef idx="0">
+            <a:schemeClr val="accent1"/>
+          </a:effectRef>
+          <a:fontRef idx="minor">
+            <a:schemeClr val="tx1"/>
+          </a:fontRef>
+        </p:style>
+      </p:cxnSp>
+    </p:spTree>
+    <p:extLst>
+      <p:ext uri="{BB962C8B-B14F-4D97-AF65-F5344CB8AC3E}">
+        <p14:creationId xmlns:p14="http://schemas.microsoft.com/office/powerpoint/2010/main" val="3824324216"/>
+      </p:ext>
+    </p:extLst>
+  </p:cSld>
+  <p:clrMapOvr>
+    <a:masterClrMapping/>
+  </p:clrMapOvr>
+</p:sld>
+</file>
+
+<file path=ppt/slides/slide4.xml><?xml version="1.0" encoding="utf-8"?>
+<p:sld xmlns:a="http://schemas.openxmlformats.org/drawingml/2006/main" xmlns:r="http://schemas.openxmlformats.org/officeDocument/2006/relationships" xmlns:p="http://schemas.openxmlformats.org/presentationml/2006/main">
+  <p:cSld>
+    <p:spTree>
+      <p:nvGrpSpPr>
+        <p:cNvPr id="1" name=""/>
+        <p:cNvGrpSpPr/>
+        <p:nvPr/>
+      </p:nvGrpSpPr>
+      <p:grpSpPr>
+        <a:xfrm>
+          <a:off x="0" y="0"/>
+          <a:ext cx="0" cy="0"/>
+          <a:chOff x="0" y="0"/>
+          <a:chExt cx="0" cy="0"/>
+        </a:xfrm>
+      </p:grpSpPr>
+      <p:cxnSp>
+        <p:nvCxnSpPr>
+          <p:cNvPr id="4" name="Conector recto 3">
+            <a:extLst>
+              <a:ext uri="{FF2B5EF4-FFF2-40B4-BE49-F238E27FC236}">
                 <a16:creationId xmlns:a16="http://schemas.microsoft.com/office/drawing/2014/main" id="{5A3819AB-78C3-4394-8CA2-0F3AD74438B9}"/>
               </a:ext>
             </a:extLst>
@@ -9100,7 +10101,7 @@
 </p:sld>
 </file>
 
-<file path=ppt/slides/slide4.xml><?xml version="1.0" encoding="utf-8"?>
+<file path=ppt/slides/slide5.xml><?xml version="1.0" encoding="utf-8"?>
 <p:sld xmlns:a="http://schemas.openxmlformats.org/drawingml/2006/main" xmlns:r="http://schemas.openxmlformats.org/officeDocument/2006/relationships" xmlns:p="http://schemas.openxmlformats.org/presentationml/2006/main">
   <p:cSld>
     <p:spTree>

</xml_diff>